<commit_message>
Screen testing reapplied without bug, +tour text
</commit_message>
<xml_diff>
--- a/MeetEDSAC/Assets/_Content/Story/story outline.pptx
+++ b/MeetEDSAC/Assets/_Content/Story/story outline.pptx
@@ -243,7 +243,7 @@
           <a:p>
             <a:fld id="{95ED7EDB-5CB9-4918-85FF-2C5E84178964}" type="datetimeFigureOut">
               <a:rPr lang="en-GB" smtClean="0"/>
-              <a:t>26/08/2015</a:t>
+              <a:t>27/08/2015</a:t>
             </a:fld>
             <a:endParaRPr lang="en-GB"/>
           </a:p>
@@ -413,7 +413,7 @@
           <a:p>
             <a:fld id="{95ED7EDB-5CB9-4918-85FF-2C5E84178964}" type="datetimeFigureOut">
               <a:rPr lang="en-GB" smtClean="0"/>
-              <a:t>26/08/2015</a:t>
+              <a:t>27/08/2015</a:t>
             </a:fld>
             <a:endParaRPr lang="en-GB"/>
           </a:p>
@@ -593,7 +593,7 @@
           <a:p>
             <a:fld id="{95ED7EDB-5CB9-4918-85FF-2C5E84178964}" type="datetimeFigureOut">
               <a:rPr lang="en-GB" smtClean="0"/>
-              <a:t>26/08/2015</a:t>
+              <a:t>27/08/2015</a:t>
             </a:fld>
             <a:endParaRPr lang="en-GB"/>
           </a:p>
@@ -763,7 +763,7 @@
           <a:p>
             <a:fld id="{95ED7EDB-5CB9-4918-85FF-2C5E84178964}" type="datetimeFigureOut">
               <a:rPr lang="en-GB" smtClean="0"/>
-              <a:t>26/08/2015</a:t>
+              <a:t>27/08/2015</a:t>
             </a:fld>
             <a:endParaRPr lang="en-GB"/>
           </a:p>
@@ -1009,7 +1009,7 @@
           <a:p>
             <a:fld id="{95ED7EDB-5CB9-4918-85FF-2C5E84178964}" type="datetimeFigureOut">
               <a:rPr lang="en-GB" smtClean="0"/>
-              <a:t>26/08/2015</a:t>
+              <a:t>27/08/2015</a:t>
             </a:fld>
             <a:endParaRPr lang="en-GB"/>
           </a:p>
@@ -1241,7 +1241,7 @@
           <a:p>
             <a:fld id="{95ED7EDB-5CB9-4918-85FF-2C5E84178964}" type="datetimeFigureOut">
               <a:rPr lang="en-GB" smtClean="0"/>
-              <a:t>26/08/2015</a:t>
+              <a:t>27/08/2015</a:t>
             </a:fld>
             <a:endParaRPr lang="en-GB"/>
           </a:p>
@@ -1608,7 +1608,7 @@
           <a:p>
             <a:fld id="{95ED7EDB-5CB9-4918-85FF-2C5E84178964}" type="datetimeFigureOut">
               <a:rPr lang="en-GB" smtClean="0"/>
-              <a:t>26/08/2015</a:t>
+              <a:t>27/08/2015</a:t>
             </a:fld>
             <a:endParaRPr lang="en-GB"/>
           </a:p>
@@ -1726,7 +1726,7 @@
           <a:p>
             <a:fld id="{95ED7EDB-5CB9-4918-85FF-2C5E84178964}" type="datetimeFigureOut">
               <a:rPr lang="en-GB" smtClean="0"/>
-              <a:t>26/08/2015</a:t>
+              <a:t>27/08/2015</a:t>
             </a:fld>
             <a:endParaRPr lang="en-GB"/>
           </a:p>
@@ -1821,7 +1821,7 @@
           <a:p>
             <a:fld id="{95ED7EDB-5CB9-4918-85FF-2C5E84178964}" type="datetimeFigureOut">
               <a:rPr lang="en-GB" smtClean="0"/>
-              <a:t>26/08/2015</a:t>
+              <a:t>27/08/2015</a:t>
             </a:fld>
             <a:endParaRPr lang="en-GB"/>
           </a:p>
@@ -2098,7 +2098,7 @@
           <a:p>
             <a:fld id="{95ED7EDB-5CB9-4918-85FF-2C5E84178964}" type="datetimeFigureOut">
               <a:rPr lang="en-GB" smtClean="0"/>
-              <a:t>26/08/2015</a:t>
+              <a:t>27/08/2015</a:t>
             </a:fld>
             <a:endParaRPr lang="en-GB"/>
           </a:p>
@@ -2351,7 +2351,7 @@
           <a:p>
             <a:fld id="{95ED7EDB-5CB9-4918-85FF-2C5E84178964}" type="datetimeFigureOut">
               <a:rPr lang="en-GB" smtClean="0"/>
-              <a:t>26/08/2015</a:t>
+              <a:t>27/08/2015</a:t>
             </a:fld>
             <a:endParaRPr lang="en-GB"/>
           </a:p>
@@ -2564,7 +2564,7 @@
           <a:p>
             <a:fld id="{95ED7EDB-5CB9-4918-85FF-2C5E84178964}" type="datetimeFigureOut">
               <a:rPr lang="en-GB" smtClean="0"/>
-              <a:t>26/08/2015</a:t>
+              <a:t>27/08/2015</a:t>
             </a:fld>
             <a:endParaRPr lang="en-GB"/>
           </a:p>
@@ -3102,7 +3102,23 @@
             <a:pPr algn="ctr"/>
             <a:r>
               <a:rPr lang="en-GB" sz="1400" dirty="0" smtClean="0"/>
-              <a:t>Just like the computers of today, when turned on a low level program runs to load code into memory. Whereas nowadays we would normally first load an operating system, which would then handle our application, on the EDSAC the program that you had written would take control at this stage.</a:t>
+              <a:t>Just like the computers of today, </a:t>
+            </a:r>
+            <a:r>
+              <a:rPr lang="en-GB" sz="1400" dirty="0" smtClean="0"/>
+              <a:t>on </a:t>
+            </a:r>
+            <a:r>
+              <a:rPr lang="en-GB" sz="1400" dirty="0" err="1" smtClean="0"/>
+              <a:t>startup</a:t>
+            </a:r>
+            <a:r>
+              <a:rPr lang="en-GB" sz="1400" dirty="0" smtClean="0"/>
+              <a:t> a </a:t>
+            </a:r>
+            <a:r>
+              <a:rPr lang="en-GB" sz="1400" dirty="0" smtClean="0"/>
+              <a:t>low level program runs to load code into memory. Whereas nowadays we would normally first load an operating system, which would then handle our application, on the EDSAC the program that you had written would take control at this stage.</a:t>
             </a:r>
             <a:endParaRPr lang="en-GB" sz="1400" dirty="0"/>
           </a:p>
@@ -3614,8 +3630,8 @@
         </p:nvSpPr>
         <p:spPr>
           <a:xfrm flipH="1">
-            <a:off x="9690100" y="1469135"/>
-            <a:ext cx="2032000" cy="2620265"/>
+            <a:off x="9690100" y="2133600"/>
+            <a:ext cx="2032000" cy="1955800"/>
           </a:xfrm>
           <a:prstGeom prst="borderCallout2">
             <a:avLst>
@@ -3649,7 +3665,7 @@
             <a:pPr algn="ctr"/>
             <a:r>
               <a:rPr lang="en-GB" sz="1400" dirty="0" smtClean="0"/>
-              <a:t>The final orders in your program would normally be instructions to print an output that would be useful. The data is converted from binary into text format and sent through to the printer. And then it’s time for the process to begin again with the next scientist’s calculations.</a:t>
+              <a:t>The final orders in your program would normally be instructions to print an output that would be useful. The data is converted from binary into text format and sent through to the printer. </a:t>
             </a:r>
             <a:endParaRPr lang="en-GB" sz="1400" dirty="0"/>
           </a:p>
@@ -3804,16 +3820,3198 @@
             </a:r>
             <a:r>
               <a:rPr lang="en-GB" sz="1400" dirty="0" smtClean="0"/>
-              <a:t>. </a:t>
-            </a:r>
-            <a:r>
-              <a:rPr lang="en-GB" sz="1400" dirty="0" smtClean="0"/>
-              <a:t>When the EDSAC started up, they would rotate to give each order in turn, making a loud clicking sound.</a:t>
+              <a:t>. When the EDSAC started up, they would rotate to give each order in turn, making a loud clicking sound.</a:t>
             </a:r>
             <a:endParaRPr lang="en-GB" sz="1400" dirty="0"/>
           </a:p>
         </p:txBody>
       </p:sp>
+      <p:sp>
+        <p:nvSpPr>
+          <p:cNvPr id="24" name="Line Callout 2 23"/>
+          <p:cNvSpPr/>
+          <p:nvPr/>
+        </p:nvSpPr>
+        <p:spPr>
+          <a:xfrm>
+            <a:off x="10487030" y="108341"/>
+            <a:ext cx="1501770" cy="1825028"/>
+          </a:xfrm>
+          <a:prstGeom prst="borderCallout2">
+            <a:avLst>
+              <a:gd name="adj1" fmla="val 95056"/>
+              <a:gd name="adj2" fmla="val -2558"/>
+              <a:gd name="adj3" fmla="val 95056"/>
+              <a:gd name="adj4" fmla="val -8119"/>
+              <a:gd name="adj5" fmla="val 109276"/>
+              <a:gd name="adj6" fmla="val -10599"/>
+            </a:avLst>
+          </a:prstGeom>
+        </p:spPr>
+        <p:style>
+          <a:lnRef idx="2">
+            <a:schemeClr val="accent1"/>
+          </a:lnRef>
+          <a:fillRef idx="1">
+            <a:schemeClr val="lt1"/>
+          </a:fillRef>
+          <a:effectRef idx="0">
+            <a:schemeClr val="accent1"/>
+          </a:effectRef>
+          <a:fontRef idx="minor">
+            <a:schemeClr val="dk1"/>
+          </a:fontRef>
+        </p:style>
+        <p:txBody>
+          <a:bodyPr rtlCol="0" anchor="ctr"/>
+          <a:lstStyle/>
+          <a:p>
+            <a:pPr algn="ctr"/>
+            <a:r>
+              <a:rPr lang="en-GB" sz="1400" dirty="0"/>
+              <a:t>And then it’s time for the process to begin again with the next scientist’s calculations.</a:t>
+            </a:r>
+            <a:endParaRPr lang="en-GB" sz="1400" dirty="0"/>
+          </a:p>
+        </p:txBody>
+      </p:sp>
+      <p:graphicFrame>
+        <p:nvGraphicFramePr>
+          <p:cNvPr id="2" name="Table 1"/>
+          <p:cNvGraphicFramePr>
+            <a:graphicFrameLocks noGrp="1"/>
+          </p:cNvGraphicFramePr>
+          <p:nvPr>
+            <p:extLst>
+              <p:ext uri="{D42A27DB-BD31-4B8C-83A1-F6EECF244321}">
+                <p14:modId xmlns:p14="http://schemas.microsoft.com/office/powerpoint/2010/main" val="2045663633"/>
+              </p:ext>
+            </p:extLst>
+          </p:nvPr>
+        </p:nvGraphicFramePr>
+        <p:xfrm>
+          <a:off x="0" y="38098"/>
+          <a:ext cx="12061830" cy="7933456"/>
+        </p:xfrm>
+        <a:graphic>
+          <a:graphicData uri="http://schemas.openxmlformats.org/drawingml/2006/table">
+            <a:tbl>
+              <a:tblPr firstRow="1" bandRow="1">
+                <a:tableStyleId>{5C22544A-7EE6-4342-B048-85BDC9FD1C3A}</a:tableStyleId>
+              </a:tblPr>
+              <a:tblGrid>
+                <a:gridCol w="1206183"/>
+                <a:gridCol w="965517"/>
+                <a:gridCol w="1446849"/>
+                <a:gridCol w="1397951"/>
+                <a:gridCol w="1014415"/>
+                <a:gridCol w="1206183"/>
+                <a:gridCol w="1424302"/>
+                <a:gridCol w="988064"/>
+                <a:gridCol w="1206183"/>
+                <a:gridCol w="1206183"/>
+              </a:tblGrid>
+              <a:tr h="991682">
+                <a:tc>
+                  <a:txBody>
+                    <a:bodyPr/>
+                    <a:lstStyle/>
+                    <a:p>
+                      <a:r>
+                        <a:rPr lang="en-GB" b="1" dirty="0" smtClean="0">
+                          <a:solidFill>
+                            <a:schemeClr val="tx1"/>
+                          </a:solidFill>
+                        </a:rPr>
+                        <a:t>Far back</a:t>
+                      </a:r>
+                      <a:endParaRPr lang="en-GB" b="1" dirty="0">
+                        <a:solidFill>
+                          <a:schemeClr val="tx1"/>
+                        </a:solidFill>
+                      </a:endParaRPr>
+                    </a:p>
+                  </a:txBody>
+                  <a:tcPr>
+                    <a:lnL w="12700" cmpd="sng">
+                      <a:noFill/>
+                    </a:lnL>
+                    <a:lnR w="12700" cmpd="sng">
+                      <a:noFill/>
+                    </a:lnR>
+                    <a:lnT w="12700" cmpd="sng">
+                      <a:noFill/>
+                    </a:lnT>
+                    <a:lnB w="38100" cmpd="sng">
+                      <a:noFill/>
+                    </a:lnB>
+                    <a:lnTlToBr w="12700" cmpd="sng">
+                      <a:noFill/>
+                      <a:prstDash val="solid"/>
+                    </a:lnTlToBr>
+                    <a:lnBlToTr w="12700" cmpd="sng">
+                      <a:noFill/>
+                      <a:prstDash val="solid"/>
+                    </a:lnBlToTr>
+                    <a:noFill/>
+                  </a:tcPr>
+                </a:tc>
+                <a:tc>
+                  <a:txBody>
+                    <a:bodyPr/>
+                    <a:lstStyle/>
+                    <a:p>
+                      <a:endParaRPr lang="en-GB" b="1" dirty="0">
+                        <a:solidFill>
+                          <a:schemeClr val="tx1"/>
+                        </a:solidFill>
+                      </a:endParaRPr>
+                    </a:p>
+                  </a:txBody>
+                  <a:tcPr>
+                    <a:lnL w="12700" cmpd="sng">
+                      <a:noFill/>
+                    </a:lnL>
+                    <a:lnR w="12700" cmpd="sng">
+                      <a:noFill/>
+                    </a:lnR>
+                    <a:lnT w="12700" cmpd="sng">
+                      <a:noFill/>
+                    </a:lnT>
+                    <a:lnB w="38100" cmpd="sng">
+                      <a:noFill/>
+                    </a:lnB>
+                    <a:lnTlToBr w="12700" cmpd="sng">
+                      <a:noFill/>
+                      <a:prstDash val="solid"/>
+                    </a:lnTlToBr>
+                    <a:lnBlToTr w="12700" cmpd="sng">
+                      <a:noFill/>
+                      <a:prstDash val="solid"/>
+                    </a:lnBlToTr>
+                    <a:noFill/>
+                  </a:tcPr>
+                </a:tc>
+                <a:tc>
+                  <a:txBody>
+                    <a:bodyPr/>
+                    <a:lstStyle/>
+                    <a:p>
+                      <a:endParaRPr lang="en-GB" b="1" dirty="0">
+                        <a:solidFill>
+                          <a:schemeClr val="tx1"/>
+                        </a:solidFill>
+                      </a:endParaRPr>
+                    </a:p>
+                  </a:txBody>
+                  <a:tcPr>
+                    <a:lnL w="12700" cmpd="sng">
+                      <a:noFill/>
+                    </a:lnL>
+                    <a:lnR w="12700" cmpd="sng">
+                      <a:noFill/>
+                    </a:lnR>
+                    <a:lnT w="12700" cmpd="sng">
+                      <a:noFill/>
+                    </a:lnT>
+                    <a:lnB w="38100" cmpd="sng">
+                      <a:noFill/>
+                    </a:lnB>
+                    <a:lnTlToBr w="12700" cmpd="sng">
+                      <a:noFill/>
+                      <a:prstDash val="solid"/>
+                    </a:lnTlToBr>
+                    <a:lnBlToTr w="12700" cmpd="sng">
+                      <a:noFill/>
+                      <a:prstDash val="solid"/>
+                    </a:lnBlToTr>
+                    <a:noFill/>
+                  </a:tcPr>
+                </a:tc>
+                <a:tc>
+                  <a:txBody>
+                    <a:bodyPr/>
+                    <a:lstStyle/>
+                    <a:p>
+                      <a:endParaRPr lang="en-GB" b="1" dirty="0">
+                        <a:solidFill>
+                          <a:schemeClr val="tx1"/>
+                        </a:solidFill>
+                      </a:endParaRPr>
+                    </a:p>
+                  </a:txBody>
+                  <a:tcPr>
+                    <a:lnL w="12700" cmpd="sng">
+                      <a:noFill/>
+                    </a:lnL>
+                    <a:lnR w="12700" cmpd="sng">
+                      <a:noFill/>
+                    </a:lnR>
+                    <a:lnT w="12700" cmpd="sng">
+                      <a:noFill/>
+                    </a:lnT>
+                    <a:lnB w="38100" cmpd="sng">
+                      <a:noFill/>
+                    </a:lnB>
+                    <a:lnTlToBr w="12700" cmpd="sng">
+                      <a:noFill/>
+                      <a:prstDash val="solid"/>
+                    </a:lnTlToBr>
+                    <a:lnBlToTr w="12700" cmpd="sng">
+                      <a:noFill/>
+                      <a:prstDash val="solid"/>
+                    </a:lnBlToTr>
+                    <a:noFill/>
+                  </a:tcPr>
+                </a:tc>
+                <a:tc>
+                  <a:txBody>
+                    <a:bodyPr/>
+                    <a:lstStyle/>
+                    <a:p>
+                      <a:r>
+                        <a:rPr lang="en-GB" b="1" dirty="0" smtClean="0">
+                          <a:solidFill>
+                            <a:schemeClr val="tx1"/>
+                          </a:solidFill>
+                        </a:rPr>
+                        <a:t>Flashing units</a:t>
+                      </a:r>
+                      <a:endParaRPr lang="en-GB" b="1" dirty="0">
+                        <a:solidFill>
+                          <a:schemeClr val="tx1"/>
+                        </a:solidFill>
+                      </a:endParaRPr>
+                    </a:p>
+                  </a:txBody>
+                  <a:tcPr>
+                    <a:lnL w="12700" cmpd="sng">
+                      <a:noFill/>
+                    </a:lnL>
+                    <a:lnR w="12700" cmpd="sng">
+                      <a:noFill/>
+                    </a:lnR>
+                    <a:lnT w="12700" cmpd="sng">
+                      <a:noFill/>
+                    </a:lnT>
+                    <a:lnB w="38100" cmpd="sng">
+                      <a:noFill/>
+                    </a:lnB>
+                    <a:lnTlToBr w="12700" cmpd="sng">
+                      <a:noFill/>
+                      <a:prstDash val="solid"/>
+                    </a:lnTlToBr>
+                    <a:lnBlToTr w="12700" cmpd="sng">
+                      <a:noFill/>
+                      <a:prstDash val="solid"/>
+                    </a:lnBlToTr>
+                    <a:noFill/>
+                  </a:tcPr>
+                </a:tc>
+                <a:tc>
+                  <a:txBody>
+                    <a:bodyPr/>
+                    <a:lstStyle/>
+                    <a:p>
+                      <a:endParaRPr lang="en-GB" b="1" dirty="0">
+                        <a:solidFill>
+                          <a:schemeClr val="tx1"/>
+                        </a:solidFill>
+                      </a:endParaRPr>
+                    </a:p>
+                  </a:txBody>
+                  <a:tcPr>
+                    <a:lnL w="12700" cmpd="sng">
+                      <a:noFill/>
+                    </a:lnL>
+                    <a:lnR w="12700" cmpd="sng">
+                      <a:noFill/>
+                    </a:lnR>
+                    <a:lnT w="12700" cmpd="sng">
+                      <a:noFill/>
+                    </a:lnT>
+                    <a:lnB w="38100" cmpd="sng">
+                      <a:noFill/>
+                    </a:lnB>
+                    <a:lnTlToBr w="12700" cmpd="sng">
+                      <a:noFill/>
+                      <a:prstDash val="solid"/>
+                    </a:lnTlToBr>
+                    <a:lnBlToTr w="12700" cmpd="sng">
+                      <a:noFill/>
+                      <a:prstDash val="solid"/>
+                    </a:lnBlToTr>
+                    <a:noFill/>
+                  </a:tcPr>
+                </a:tc>
+                <a:tc>
+                  <a:txBody>
+                    <a:bodyPr/>
+                    <a:lstStyle/>
+                    <a:p>
+                      <a:r>
+                        <a:rPr lang="en-GB" b="1" dirty="0" smtClean="0">
+                          <a:solidFill>
+                            <a:schemeClr val="tx1"/>
+                          </a:solidFill>
+                        </a:rPr>
+                        <a:t>Primary + sec decoders</a:t>
+                      </a:r>
+                      <a:endParaRPr lang="en-GB" b="1" dirty="0">
+                        <a:solidFill>
+                          <a:schemeClr val="tx1"/>
+                        </a:solidFill>
+                      </a:endParaRPr>
+                    </a:p>
+                  </a:txBody>
+                  <a:tcPr>
+                    <a:lnL w="12700" cmpd="sng">
+                      <a:noFill/>
+                    </a:lnL>
+                    <a:lnR w="12700" cmpd="sng">
+                      <a:noFill/>
+                    </a:lnR>
+                    <a:lnT w="12700" cmpd="sng">
+                      <a:noFill/>
+                    </a:lnT>
+                    <a:lnB w="38100" cmpd="sng">
+                      <a:noFill/>
+                    </a:lnB>
+                    <a:lnTlToBr w="12700" cmpd="sng">
+                      <a:noFill/>
+                      <a:prstDash val="solid"/>
+                    </a:lnTlToBr>
+                    <a:lnBlToTr w="12700" cmpd="sng">
+                      <a:noFill/>
+                      <a:prstDash val="solid"/>
+                    </a:lnBlToTr>
+                    <a:noFill/>
+                  </a:tcPr>
+                </a:tc>
+                <a:tc>
+                  <a:txBody>
+                    <a:bodyPr/>
+                    <a:lstStyle/>
+                    <a:p>
+                      <a:endParaRPr lang="en-GB" b="1" dirty="0">
+                        <a:solidFill>
+                          <a:schemeClr val="tx1"/>
+                        </a:solidFill>
+                      </a:endParaRPr>
+                    </a:p>
+                  </a:txBody>
+                  <a:tcPr>
+                    <a:lnL w="12700" cmpd="sng">
+                      <a:noFill/>
+                    </a:lnL>
+                    <a:lnR w="12700" cmpd="sng">
+                      <a:noFill/>
+                    </a:lnR>
+                    <a:lnT w="12700" cmpd="sng">
+                      <a:noFill/>
+                    </a:lnT>
+                    <a:lnB w="38100" cmpd="sng">
+                      <a:noFill/>
+                    </a:lnB>
+                    <a:lnTlToBr w="12700" cmpd="sng">
+                      <a:noFill/>
+                      <a:prstDash val="solid"/>
+                    </a:lnTlToBr>
+                    <a:lnBlToTr w="12700" cmpd="sng">
+                      <a:noFill/>
+                      <a:prstDash val="solid"/>
+                    </a:lnBlToTr>
+                    <a:noFill/>
+                  </a:tcPr>
+                </a:tc>
+                <a:tc>
+                  <a:txBody>
+                    <a:bodyPr/>
+                    <a:lstStyle/>
+                    <a:p>
+                      <a:endParaRPr lang="en-GB" b="1" dirty="0">
+                        <a:solidFill>
+                          <a:schemeClr val="tx1"/>
+                        </a:solidFill>
+                      </a:endParaRPr>
+                    </a:p>
+                  </a:txBody>
+                  <a:tcPr>
+                    <a:lnL w="12700" cmpd="sng">
+                      <a:noFill/>
+                    </a:lnL>
+                    <a:lnR w="12700" cmpd="sng">
+                      <a:noFill/>
+                    </a:lnR>
+                    <a:lnT w="12700" cmpd="sng">
+                      <a:noFill/>
+                    </a:lnT>
+                    <a:lnB w="38100" cmpd="sng">
+                      <a:noFill/>
+                    </a:lnB>
+                    <a:lnTlToBr w="12700" cmpd="sng">
+                      <a:noFill/>
+                      <a:prstDash val="solid"/>
+                    </a:lnTlToBr>
+                    <a:lnBlToTr w="12700" cmpd="sng">
+                      <a:noFill/>
+                      <a:prstDash val="solid"/>
+                    </a:lnBlToTr>
+                    <a:noFill/>
+                  </a:tcPr>
+                </a:tc>
+                <a:tc>
+                  <a:txBody>
+                    <a:bodyPr/>
+                    <a:lstStyle/>
+                    <a:p>
+                      <a:endParaRPr lang="en-GB" b="1" dirty="0">
+                        <a:solidFill>
+                          <a:schemeClr val="tx1"/>
+                        </a:solidFill>
+                      </a:endParaRPr>
+                    </a:p>
+                  </a:txBody>
+                  <a:tcPr>
+                    <a:lnL w="12700" cmpd="sng">
+                      <a:noFill/>
+                    </a:lnL>
+                    <a:lnR w="12700" cmpd="sng">
+                      <a:noFill/>
+                    </a:lnR>
+                    <a:lnT w="12700" cmpd="sng">
+                      <a:noFill/>
+                    </a:lnT>
+                    <a:lnB w="38100" cmpd="sng">
+                      <a:noFill/>
+                    </a:lnB>
+                    <a:lnTlToBr w="12700" cmpd="sng">
+                      <a:noFill/>
+                      <a:prstDash val="solid"/>
+                    </a:lnTlToBr>
+                    <a:lnBlToTr w="12700" cmpd="sng">
+                      <a:noFill/>
+                      <a:prstDash val="solid"/>
+                    </a:lnBlToTr>
+                    <a:noFill/>
+                  </a:tcPr>
+                </a:tc>
+              </a:tr>
+              <a:tr h="991682">
+                <a:tc>
+                  <a:txBody>
+                    <a:bodyPr/>
+                    <a:lstStyle/>
+                    <a:p>
+                      <a:endParaRPr lang="en-GB" b="1" dirty="0">
+                        <a:solidFill>
+                          <a:schemeClr val="tx1"/>
+                        </a:solidFill>
+                      </a:endParaRPr>
+                    </a:p>
+                  </a:txBody>
+                  <a:tcPr>
+                    <a:lnL w="12700" cmpd="sng">
+                      <a:noFill/>
+                    </a:lnL>
+                    <a:lnR w="12700" cmpd="sng">
+                      <a:noFill/>
+                    </a:lnR>
+                    <a:lnT w="38100" cmpd="sng">
+                      <a:noFill/>
+                    </a:lnT>
+                    <a:lnB w="12700" cmpd="sng">
+                      <a:noFill/>
+                    </a:lnB>
+                    <a:lnTlToBr w="12700" cmpd="sng">
+                      <a:noFill/>
+                      <a:prstDash val="solid"/>
+                    </a:lnTlToBr>
+                    <a:lnBlToTr w="12700" cmpd="sng">
+                      <a:noFill/>
+                      <a:prstDash val="solid"/>
+                    </a:lnBlToTr>
+                    <a:noFill/>
+                  </a:tcPr>
+                </a:tc>
+                <a:tc>
+                  <a:txBody>
+                    <a:bodyPr/>
+                    <a:lstStyle/>
+                    <a:p>
+                      <a:endParaRPr lang="en-GB" b="1" dirty="0">
+                        <a:solidFill>
+                          <a:schemeClr val="tx1"/>
+                        </a:solidFill>
+                      </a:endParaRPr>
+                    </a:p>
+                  </a:txBody>
+                  <a:tcPr>
+                    <a:lnL w="12700" cmpd="sng">
+                      <a:noFill/>
+                    </a:lnL>
+                    <a:lnR w="12700" cmpd="sng">
+                      <a:noFill/>
+                    </a:lnR>
+                    <a:lnT w="38100" cmpd="sng">
+                      <a:noFill/>
+                    </a:lnT>
+                    <a:lnB w="12700" cmpd="sng">
+                      <a:noFill/>
+                    </a:lnB>
+                    <a:lnTlToBr w="12700" cmpd="sng">
+                      <a:noFill/>
+                      <a:prstDash val="solid"/>
+                    </a:lnTlToBr>
+                    <a:lnBlToTr w="12700" cmpd="sng">
+                      <a:noFill/>
+                      <a:prstDash val="solid"/>
+                    </a:lnBlToTr>
+                    <a:noFill/>
+                  </a:tcPr>
+                </a:tc>
+                <a:tc>
+                  <a:txBody>
+                    <a:bodyPr/>
+                    <a:lstStyle/>
+                    <a:p>
+                      <a:r>
+                        <a:rPr lang="en-GB" b="1" dirty="0" smtClean="0">
+                          <a:solidFill>
+                            <a:schemeClr val="tx1"/>
+                          </a:solidFill>
+                        </a:rPr>
+                        <a:t>Fly around</a:t>
+                      </a:r>
+                      <a:endParaRPr lang="en-GB" b="1" dirty="0">
+                        <a:solidFill>
+                          <a:schemeClr val="tx1"/>
+                        </a:solidFill>
+                      </a:endParaRPr>
+                    </a:p>
+                  </a:txBody>
+                  <a:tcPr>
+                    <a:lnL w="12700" cmpd="sng">
+                      <a:noFill/>
+                    </a:lnL>
+                    <a:lnR w="12700" cmpd="sng">
+                      <a:noFill/>
+                    </a:lnR>
+                    <a:lnT w="38100" cmpd="sng">
+                      <a:noFill/>
+                    </a:lnT>
+                    <a:lnB w="12700" cmpd="sng">
+                      <a:noFill/>
+                    </a:lnB>
+                    <a:lnTlToBr w="12700" cmpd="sng">
+                      <a:noFill/>
+                      <a:prstDash val="solid"/>
+                    </a:lnTlToBr>
+                    <a:lnBlToTr w="12700" cmpd="sng">
+                      <a:noFill/>
+                      <a:prstDash val="solid"/>
+                    </a:lnBlToTr>
+                    <a:noFill/>
+                  </a:tcPr>
+                </a:tc>
+                <a:tc>
+                  <a:txBody>
+                    <a:bodyPr/>
+                    <a:lstStyle/>
+                    <a:p>
+                      <a:endParaRPr lang="en-GB" b="1" dirty="0">
+                        <a:solidFill>
+                          <a:schemeClr val="tx1"/>
+                        </a:solidFill>
+                      </a:endParaRPr>
+                    </a:p>
+                  </a:txBody>
+                  <a:tcPr>
+                    <a:lnL w="12700" cmpd="sng">
+                      <a:noFill/>
+                    </a:lnL>
+                    <a:lnR w="12700" cmpd="sng">
+                      <a:noFill/>
+                    </a:lnR>
+                    <a:lnT w="38100" cmpd="sng">
+                      <a:noFill/>
+                    </a:lnT>
+                    <a:lnB w="12700" cmpd="sng">
+                      <a:noFill/>
+                    </a:lnB>
+                    <a:lnTlToBr w="12700" cmpd="sng">
+                      <a:noFill/>
+                      <a:prstDash val="solid"/>
+                    </a:lnTlToBr>
+                    <a:lnBlToTr w="12700" cmpd="sng">
+                      <a:noFill/>
+                      <a:prstDash val="solid"/>
+                    </a:lnBlToTr>
+                    <a:noFill/>
+                  </a:tcPr>
+                </a:tc>
+                <a:tc>
+                  <a:txBody>
+                    <a:bodyPr/>
+                    <a:lstStyle/>
+                    <a:p>
+                      <a:endParaRPr lang="en-GB" b="1" dirty="0">
+                        <a:solidFill>
+                          <a:schemeClr val="tx1"/>
+                        </a:solidFill>
+                      </a:endParaRPr>
+                    </a:p>
+                  </a:txBody>
+                  <a:tcPr>
+                    <a:lnL w="12700" cmpd="sng">
+                      <a:noFill/>
+                    </a:lnL>
+                    <a:lnR w="12700" cmpd="sng">
+                      <a:noFill/>
+                    </a:lnR>
+                    <a:lnT w="38100" cmpd="sng">
+                      <a:noFill/>
+                    </a:lnT>
+                    <a:lnB w="12700" cmpd="sng">
+                      <a:noFill/>
+                    </a:lnB>
+                    <a:lnTlToBr w="12700" cmpd="sng">
+                      <a:noFill/>
+                      <a:prstDash val="solid"/>
+                    </a:lnTlToBr>
+                    <a:lnBlToTr w="12700" cmpd="sng">
+                      <a:noFill/>
+                      <a:prstDash val="solid"/>
+                    </a:lnBlToTr>
+                    <a:noFill/>
+                  </a:tcPr>
+                </a:tc>
+                <a:tc>
+                  <a:txBody>
+                    <a:bodyPr/>
+                    <a:lstStyle/>
+                    <a:p>
+                      <a:endParaRPr lang="en-GB" b="1" dirty="0">
+                        <a:solidFill>
+                          <a:schemeClr val="tx1"/>
+                        </a:solidFill>
+                      </a:endParaRPr>
+                    </a:p>
+                  </a:txBody>
+                  <a:tcPr>
+                    <a:lnL w="12700" cmpd="sng">
+                      <a:noFill/>
+                    </a:lnL>
+                    <a:lnR w="12700" cmpd="sng">
+                      <a:noFill/>
+                    </a:lnR>
+                    <a:lnT w="38100" cmpd="sng">
+                      <a:noFill/>
+                    </a:lnT>
+                    <a:lnB w="12700" cmpd="sng">
+                      <a:noFill/>
+                    </a:lnB>
+                    <a:lnTlToBr w="12700" cmpd="sng">
+                      <a:noFill/>
+                      <a:prstDash val="solid"/>
+                    </a:lnTlToBr>
+                    <a:lnBlToTr w="12700" cmpd="sng">
+                      <a:noFill/>
+                      <a:prstDash val="solid"/>
+                    </a:lnBlToTr>
+                    <a:noFill/>
+                  </a:tcPr>
+                </a:tc>
+                <a:tc>
+                  <a:txBody>
+                    <a:bodyPr/>
+                    <a:lstStyle/>
+                    <a:p>
+                      <a:pPr algn="r"/>
+                      <a:r>
+                        <a:rPr lang="en-GB" b="1" dirty="0" smtClean="0">
+                          <a:solidFill>
+                            <a:schemeClr val="tx1"/>
+                          </a:solidFill>
+                        </a:rPr>
+                        <a:t>Coders</a:t>
+                      </a:r>
+                      <a:endParaRPr lang="en-GB" b="1" dirty="0">
+                        <a:solidFill>
+                          <a:schemeClr val="tx1"/>
+                        </a:solidFill>
+                      </a:endParaRPr>
+                    </a:p>
+                  </a:txBody>
+                  <a:tcPr>
+                    <a:lnL w="12700" cmpd="sng">
+                      <a:noFill/>
+                    </a:lnL>
+                    <a:lnR w="12700" cmpd="sng">
+                      <a:noFill/>
+                    </a:lnR>
+                    <a:lnT w="38100" cmpd="sng">
+                      <a:noFill/>
+                    </a:lnT>
+                    <a:lnB w="12700" cmpd="sng">
+                      <a:noFill/>
+                    </a:lnB>
+                    <a:lnTlToBr w="12700" cmpd="sng">
+                      <a:noFill/>
+                      <a:prstDash val="solid"/>
+                    </a:lnTlToBr>
+                    <a:lnBlToTr w="12700" cmpd="sng">
+                      <a:noFill/>
+                      <a:prstDash val="solid"/>
+                    </a:lnBlToTr>
+                    <a:noFill/>
+                  </a:tcPr>
+                </a:tc>
+                <a:tc>
+                  <a:txBody>
+                    <a:bodyPr/>
+                    <a:lstStyle/>
+                    <a:p>
+                      <a:endParaRPr lang="en-GB" b="1" dirty="0">
+                        <a:solidFill>
+                          <a:schemeClr val="tx1"/>
+                        </a:solidFill>
+                      </a:endParaRPr>
+                    </a:p>
+                  </a:txBody>
+                  <a:tcPr>
+                    <a:lnL w="12700" cmpd="sng">
+                      <a:noFill/>
+                    </a:lnL>
+                    <a:lnR w="12700" cmpd="sng">
+                      <a:noFill/>
+                    </a:lnR>
+                    <a:lnT w="38100" cmpd="sng">
+                      <a:noFill/>
+                    </a:lnT>
+                    <a:lnB w="12700" cmpd="sng">
+                      <a:noFill/>
+                    </a:lnB>
+                    <a:lnTlToBr w="12700" cmpd="sng">
+                      <a:noFill/>
+                      <a:prstDash val="solid"/>
+                    </a:lnTlToBr>
+                    <a:lnBlToTr w="12700" cmpd="sng">
+                      <a:noFill/>
+                      <a:prstDash val="solid"/>
+                    </a:lnBlToTr>
+                    <a:noFill/>
+                  </a:tcPr>
+                </a:tc>
+                <a:tc>
+                  <a:txBody>
+                    <a:bodyPr/>
+                    <a:lstStyle/>
+                    <a:p>
+                      <a:endParaRPr lang="en-GB" b="1" dirty="0">
+                        <a:solidFill>
+                          <a:schemeClr val="tx1"/>
+                        </a:solidFill>
+                      </a:endParaRPr>
+                    </a:p>
+                  </a:txBody>
+                  <a:tcPr>
+                    <a:lnL w="12700" cmpd="sng">
+                      <a:noFill/>
+                    </a:lnL>
+                    <a:lnR w="12700" cmpd="sng">
+                      <a:noFill/>
+                    </a:lnR>
+                    <a:lnT w="38100" cmpd="sng">
+                      <a:noFill/>
+                    </a:lnT>
+                    <a:lnB w="12700" cmpd="sng">
+                      <a:noFill/>
+                    </a:lnB>
+                    <a:lnTlToBr w="12700" cmpd="sng">
+                      <a:noFill/>
+                      <a:prstDash val="solid"/>
+                    </a:lnTlToBr>
+                    <a:lnBlToTr w="12700" cmpd="sng">
+                      <a:noFill/>
+                      <a:prstDash val="solid"/>
+                    </a:lnBlToTr>
+                    <a:noFill/>
+                  </a:tcPr>
+                </a:tc>
+                <a:tc>
+                  <a:txBody>
+                    <a:bodyPr/>
+                    <a:lstStyle/>
+                    <a:p>
+                      <a:r>
+                        <a:rPr lang="en-GB" b="1" dirty="0" smtClean="0">
+                          <a:solidFill>
+                            <a:schemeClr val="tx1"/>
+                          </a:solidFill>
+                        </a:rPr>
+                        <a:t>Closer</a:t>
+                      </a:r>
+                      <a:r>
+                        <a:rPr lang="en-GB" b="1" baseline="0" dirty="0" smtClean="0">
+                          <a:solidFill>
+                            <a:schemeClr val="tx1"/>
+                          </a:solidFill>
+                        </a:rPr>
+                        <a:t> front view</a:t>
+                      </a:r>
+                      <a:endParaRPr lang="en-GB" b="1" dirty="0">
+                        <a:solidFill>
+                          <a:schemeClr val="tx1"/>
+                        </a:solidFill>
+                      </a:endParaRPr>
+                    </a:p>
+                  </a:txBody>
+                  <a:tcPr>
+                    <a:lnL w="12700" cmpd="sng">
+                      <a:noFill/>
+                    </a:lnL>
+                    <a:lnR w="12700" cmpd="sng">
+                      <a:noFill/>
+                    </a:lnR>
+                    <a:lnT w="38100" cmpd="sng">
+                      <a:noFill/>
+                    </a:lnT>
+                    <a:lnB w="12700" cmpd="sng">
+                      <a:noFill/>
+                    </a:lnB>
+                    <a:lnTlToBr w="12700" cmpd="sng">
+                      <a:noFill/>
+                      <a:prstDash val="solid"/>
+                    </a:lnTlToBr>
+                    <a:lnBlToTr w="12700" cmpd="sng">
+                      <a:noFill/>
+                      <a:prstDash val="solid"/>
+                    </a:lnBlToTr>
+                    <a:noFill/>
+                  </a:tcPr>
+                </a:tc>
+              </a:tr>
+              <a:tr h="991682">
+                <a:tc>
+                  <a:txBody>
+                    <a:bodyPr/>
+                    <a:lstStyle/>
+                    <a:p>
+                      <a:r>
+                        <a:rPr lang="en-GB" b="1" dirty="0" smtClean="0">
+                          <a:solidFill>
+                            <a:schemeClr val="tx1"/>
+                          </a:solidFill>
+                        </a:rPr>
+                        <a:t>Closer front view</a:t>
+                      </a:r>
+                      <a:endParaRPr lang="en-GB" b="1" dirty="0">
+                        <a:solidFill>
+                          <a:schemeClr val="tx1"/>
+                        </a:solidFill>
+                      </a:endParaRPr>
+                    </a:p>
+                  </a:txBody>
+                  <a:tcPr>
+                    <a:lnL w="12700" cmpd="sng">
+                      <a:noFill/>
+                    </a:lnL>
+                    <a:lnR w="12700" cmpd="sng">
+                      <a:noFill/>
+                    </a:lnR>
+                    <a:lnT w="12700" cmpd="sng">
+                      <a:noFill/>
+                    </a:lnT>
+                    <a:lnB w="12700" cmpd="sng">
+                      <a:noFill/>
+                    </a:lnB>
+                    <a:lnTlToBr w="12700" cmpd="sng">
+                      <a:noFill/>
+                      <a:prstDash val="solid"/>
+                    </a:lnTlToBr>
+                    <a:lnBlToTr w="12700" cmpd="sng">
+                      <a:noFill/>
+                      <a:prstDash val="solid"/>
+                    </a:lnBlToTr>
+                    <a:noFill/>
+                  </a:tcPr>
+                </a:tc>
+                <a:tc>
+                  <a:txBody>
+                    <a:bodyPr/>
+                    <a:lstStyle/>
+                    <a:p>
+                      <a:endParaRPr lang="en-GB" b="1" dirty="0">
+                        <a:solidFill>
+                          <a:schemeClr val="tx1"/>
+                        </a:solidFill>
+                      </a:endParaRPr>
+                    </a:p>
+                  </a:txBody>
+                  <a:tcPr>
+                    <a:lnL w="12700" cmpd="sng">
+                      <a:noFill/>
+                    </a:lnL>
+                    <a:lnR w="12700" cmpd="sng">
+                      <a:noFill/>
+                    </a:lnR>
+                    <a:lnT w="12700" cmpd="sng">
+                      <a:noFill/>
+                    </a:lnT>
+                    <a:lnB w="12700" cmpd="sng">
+                      <a:noFill/>
+                    </a:lnB>
+                    <a:lnTlToBr w="12700" cmpd="sng">
+                      <a:noFill/>
+                      <a:prstDash val="solid"/>
+                    </a:lnTlToBr>
+                    <a:lnBlToTr w="12700" cmpd="sng">
+                      <a:noFill/>
+                      <a:prstDash val="solid"/>
+                    </a:lnBlToTr>
+                    <a:noFill/>
+                  </a:tcPr>
+                </a:tc>
+                <a:tc>
+                  <a:txBody>
+                    <a:bodyPr/>
+                    <a:lstStyle/>
+                    <a:p>
+                      <a:endParaRPr lang="en-GB" b="1" dirty="0">
+                        <a:solidFill>
+                          <a:schemeClr val="tx1"/>
+                        </a:solidFill>
+                      </a:endParaRPr>
+                    </a:p>
+                  </a:txBody>
+                  <a:tcPr>
+                    <a:lnL w="12700" cmpd="sng">
+                      <a:noFill/>
+                    </a:lnL>
+                    <a:lnR w="12700" cmpd="sng">
+                      <a:noFill/>
+                    </a:lnR>
+                    <a:lnT w="12700" cmpd="sng">
+                      <a:noFill/>
+                    </a:lnT>
+                    <a:lnB w="12700" cmpd="sng">
+                      <a:noFill/>
+                    </a:lnB>
+                    <a:lnTlToBr w="12700" cmpd="sng">
+                      <a:noFill/>
+                      <a:prstDash val="solid"/>
+                    </a:lnTlToBr>
+                    <a:lnBlToTr w="12700" cmpd="sng">
+                      <a:noFill/>
+                      <a:prstDash val="solid"/>
+                    </a:lnBlToTr>
+                    <a:noFill/>
+                  </a:tcPr>
+                </a:tc>
+                <a:tc>
+                  <a:txBody>
+                    <a:bodyPr/>
+                    <a:lstStyle/>
+                    <a:p>
+                      <a:endParaRPr lang="en-GB" b="1" dirty="0">
+                        <a:solidFill>
+                          <a:schemeClr val="tx1"/>
+                        </a:solidFill>
+                      </a:endParaRPr>
+                    </a:p>
+                  </a:txBody>
+                  <a:tcPr>
+                    <a:lnL w="12700" cmpd="sng">
+                      <a:noFill/>
+                    </a:lnL>
+                    <a:lnR w="12700" cmpd="sng">
+                      <a:noFill/>
+                    </a:lnR>
+                    <a:lnT w="12700" cmpd="sng">
+                      <a:noFill/>
+                    </a:lnT>
+                    <a:lnB w="12700" cmpd="sng">
+                      <a:noFill/>
+                    </a:lnB>
+                    <a:lnTlToBr w="12700" cmpd="sng">
+                      <a:noFill/>
+                      <a:prstDash val="solid"/>
+                    </a:lnTlToBr>
+                    <a:lnBlToTr w="12700" cmpd="sng">
+                      <a:noFill/>
+                      <a:prstDash val="solid"/>
+                    </a:lnBlToTr>
+                    <a:noFill/>
+                  </a:tcPr>
+                </a:tc>
+                <a:tc>
+                  <a:txBody>
+                    <a:bodyPr/>
+                    <a:lstStyle/>
+                    <a:p>
+                      <a:r>
+                        <a:rPr lang="en-GB" b="1" dirty="0" smtClean="0">
+                          <a:solidFill>
+                            <a:schemeClr val="tx1"/>
+                          </a:solidFill>
+                        </a:rPr>
+                        <a:t>Show all</a:t>
+                      </a:r>
+                      <a:endParaRPr lang="en-GB" b="1" dirty="0">
+                        <a:solidFill>
+                          <a:schemeClr val="tx1"/>
+                        </a:solidFill>
+                      </a:endParaRPr>
+                    </a:p>
+                  </a:txBody>
+                  <a:tcPr>
+                    <a:lnL w="12700" cmpd="sng">
+                      <a:noFill/>
+                    </a:lnL>
+                    <a:lnR w="12700" cmpd="sng">
+                      <a:noFill/>
+                    </a:lnR>
+                    <a:lnT w="12700" cmpd="sng">
+                      <a:noFill/>
+                    </a:lnT>
+                    <a:lnB w="12700" cmpd="sng">
+                      <a:noFill/>
+                    </a:lnB>
+                    <a:lnTlToBr w="12700" cmpd="sng">
+                      <a:noFill/>
+                      <a:prstDash val="solid"/>
+                    </a:lnTlToBr>
+                    <a:lnBlToTr w="12700" cmpd="sng">
+                      <a:noFill/>
+                      <a:prstDash val="solid"/>
+                    </a:lnBlToTr>
+                    <a:noFill/>
+                  </a:tcPr>
+                </a:tc>
+                <a:tc>
+                  <a:txBody>
+                    <a:bodyPr/>
+                    <a:lstStyle/>
+                    <a:p>
+                      <a:r>
+                        <a:rPr lang="en-GB" b="1" dirty="0" smtClean="0">
+                          <a:solidFill>
+                            <a:schemeClr val="tx1"/>
+                          </a:solidFill>
+                        </a:rPr>
+                        <a:t>rel.</a:t>
+                      </a:r>
+                      <a:r>
+                        <a:rPr lang="en-GB" b="1" baseline="0" dirty="0" smtClean="0">
+                          <a:solidFill>
+                            <a:schemeClr val="tx1"/>
+                          </a:solidFill>
+                        </a:rPr>
+                        <a:t> label</a:t>
+                      </a:r>
+                      <a:endParaRPr lang="en-GB" b="1" dirty="0">
+                        <a:solidFill>
+                          <a:schemeClr val="tx1"/>
+                        </a:solidFill>
+                      </a:endParaRPr>
+                    </a:p>
+                  </a:txBody>
+                  <a:tcPr>
+                    <a:lnL w="12700" cmpd="sng">
+                      <a:noFill/>
+                    </a:lnL>
+                    <a:lnR w="12700" cmpd="sng">
+                      <a:noFill/>
+                    </a:lnR>
+                    <a:lnT w="12700" cmpd="sng">
+                      <a:noFill/>
+                    </a:lnT>
+                    <a:lnB w="12700" cmpd="sng">
+                      <a:noFill/>
+                    </a:lnB>
+                    <a:lnTlToBr w="12700" cmpd="sng">
+                      <a:noFill/>
+                      <a:prstDash val="solid"/>
+                    </a:lnTlToBr>
+                    <a:lnBlToTr w="12700" cmpd="sng">
+                      <a:noFill/>
+                      <a:prstDash val="solid"/>
+                    </a:lnBlToTr>
+                    <a:noFill/>
+                  </a:tcPr>
+                </a:tc>
+                <a:tc>
+                  <a:txBody>
+                    <a:bodyPr/>
+                    <a:lstStyle/>
+                    <a:p>
+                      <a:endParaRPr lang="en-GB" b="1" dirty="0">
+                        <a:solidFill>
+                          <a:schemeClr val="tx1"/>
+                        </a:solidFill>
+                      </a:endParaRPr>
+                    </a:p>
+                  </a:txBody>
+                  <a:tcPr>
+                    <a:lnL w="12700" cmpd="sng">
+                      <a:noFill/>
+                    </a:lnL>
+                    <a:lnR w="12700" cmpd="sng">
+                      <a:noFill/>
+                    </a:lnR>
+                    <a:lnT w="12700" cmpd="sng">
+                      <a:noFill/>
+                    </a:lnT>
+                    <a:lnB w="12700" cmpd="sng">
+                      <a:noFill/>
+                    </a:lnB>
+                    <a:lnTlToBr w="12700" cmpd="sng">
+                      <a:noFill/>
+                      <a:prstDash val="solid"/>
+                    </a:lnTlToBr>
+                    <a:lnBlToTr w="12700" cmpd="sng">
+                      <a:noFill/>
+                      <a:prstDash val="solid"/>
+                    </a:lnBlToTr>
+                    <a:noFill/>
+                  </a:tcPr>
+                </a:tc>
+                <a:tc>
+                  <a:txBody>
+                    <a:bodyPr/>
+                    <a:lstStyle/>
+                    <a:p>
+                      <a:endParaRPr lang="en-GB" b="1" dirty="0">
+                        <a:solidFill>
+                          <a:schemeClr val="tx1"/>
+                        </a:solidFill>
+                      </a:endParaRPr>
+                    </a:p>
+                  </a:txBody>
+                  <a:tcPr>
+                    <a:lnL w="12700" cmpd="sng">
+                      <a:noFill/>
+                    </a:lnL>
+                    <a:lnR w="12700" cmpd="sng">
+                      <a:noFill/>
+                    </a:lnR>
+                    <a:lnT w="12700" cmpd="sng">
+                      <a:noFill/>
+                    </a:lnT>
+                    <a:lnB w="12700" cmpd="sng">
+                      <a:noFill/>
+                    </a:lnB>
+                    <a:lnTlToBr w="12700" cmpd="sng">
+                      <a:noFill/>
+                      <a:prstDash val="solid"/>
+                    </a:lnTlToBr>
+                    <a:lnBlToTr w="12700" cmpd="sng">
+                      <a:noFill/>
+                      <a:prstDash val="solid"/>
+                    </a:lnBlToTr>
+                    <a:noFill/>
+                  </a:tcPr>
+                </a:tc>
+                <a:tc>
+                  <a:txBody>
+                    <a:bodyPr/>
+                    <a:lstStyle/>
+                    <a:p>
+                      <a:r>
+                        <a:rPr lang="en-GB" b="1" dirty="0" smtClean="0">
+                          <a:solidFill>
+                            <a:schemeClr val="tx1"/>
+                          </a:solidFill>
+                        </a:rPr>
+                        <a:t>Printer</a:t>
+                      </a:r>
+                      <a:endParaRPr lang="en-GB" b="1" dirty="0">
+                        <a:solidFill>
+                          <a:schemeClr val="tx1"/>
+                        </a:solidFill>
+                      </a:endParaRPr>
+                    </a:p>
+                  </a:txBody>
+                  <a:tcPr>
+                    <a:lnL w="12700" cmpd="sng">
+                      <a:noFill/>
+                    </a:lnL>
+                    <a:lnR w="12700" cmpd="sng">
+                      <a:noFill/>
+                    </a:lnR>
+                    <a:lnT w="12700" cmpd="sng">
+                      <a:noFill/>
+                    </a:lnT>
+                    <a:lnB w="12700" cmpd="sng">
+                      <a:noFill/>
+                    </a:lnB>
+                    <a:lnTlToBr w="12700" cmpd="sng">
+                      <a:noFill/>
+                      <a:prstDash val="solid"/>
+                    </a:lnTlToBr>
+                    <a:lnBlToTr w="12700" cmpd="sng">
+                      <a:noFill/>
+                      <a:prstDash val="solid"/>
+                    </a:lnBlToTr>
+                    <a:noFill/>
+                  </a:tcPr>
+                </a:tc>
+                <a:tc>
+                  <a:txBody>
+                    <a:bodyPr/>
+                    <a:lstStyle/>
+                    <a:p>
+                      <a:endParaRPr lang="en-GB" b="1" dirty="0">
+                        <a:solidFill>
+                          <a:schemeClr val="tx1"/>
+                        </a:solidFill>
+                      </a:endParaRPr>
+                    </a:p>
+                  </a:txBody>
+                  <a:tcPr>
+                    <a:lnL w="12700" cmpd="sng">
+                      <a:noFill/>
+                    </a:lnL>
+                    <a:lnR w="12700" cmpd="sng">
+                      <a:noFill/>
+                    </a:lnR>
+                    <a:lnT w="12700" cmpd="sng">
+                      <a:noFill/>
+                    </a:lnT>
+                    <a:lnB w="12700" cmpd="sng">
+                      <a:noFill/>
+                    </a:lnB>
+                    <a:lnTlToBr w="12700" cmpd="sng">
+                      <a:noFill/>
+                      <a:prstDash val="solid"/>
+                    </a:lnTlToBr>
+                    <a:lnBlToTr w="12700" cmpd="sng">
+                      <a:noFill/>
+                      <a:prstDash val="solid"/>
+                    </a:lnBlToTr>
+                    <a:noFill/>
+                  </a:tcPr>
+                </a:tc>
+              </a:tr>
+              <a:tr h="991682">
+                <a:tc>
+                  <a:txBody>
+                    <a:bodyPr/>
+                    <a:lstStyle/>
+                    <a:p>
+                      <a:endParaRPr lang="en-GB" b="1" dirty="0">
+                        <a:solidFill>
+                          <a:schemeClr val="tx1"/>
+                        </a:solidFill>
+                      </a:endParaRPr>
+                    </a:p>
+                  </a:txBody>
+                  <a:tcPr>
+                    <a:lnL w="12700" cmpd="sng">
+                      <a:noFill/>
+                    </a:lnL>
+                    <a:lnR w="12700" cmpd="sng">
+                      <a:noFill/>
+                    </a:lnR>
+                    <a:lnT w="12700" cmpd="sng">
+                      <a:noFill/>
+                    </a:lnT>
+                    <a:lnB w="12700" cmpd="sng">
+                      <a:noFill/>
+                    </a:lnB>
+                    <a:lnTlToBr w="12700" cmpd="sng">
+                      <a:noFill/>
+                      <a:prstDash val="solid"/>
+                    </a:lnTlToBr>
+                    <a:lnBlToTr w="12700" cmpd="sng">
+                      <a:noFill/>
+                      <a:prstDash val="solid"/>
+                    </a:lnBlToTr>
+                    <a:noFill/>
+                  </a:tcPr>
+                </a:tc>
+                <a:tc>
+                  <a:txBody>
+                    <a:bodyPr/>
+                    <a:lstStyle/>
+                    <a:p>
+                      <a:endParaRPr lang="en-GB" b="1">
+                        <a:solidFill>
+                          <a:schemeClr val="tx1"/>
+                        </a:solidFill>
+                      </a:endParaRPr>
+                    </a:p>
+                  </a:txBody>
+                  <a:tcPr>
+                    <a:lnL w="12700" cmpd="sng">
+                      <a:noFill/>
+                    </a:lnL>
+                    <a:lnR w="12700" cmpd="sng">
+                      <a:noFill/>
+                    </a:lnR>
+                    <a:lnT w="12700" cmpd="sng">
+                      <a:noFill/>
+                    </a:lnT>
+                    <a:lnB w="12700" cmpd="sng">
+                      <a:noFill/>
+                    </a:lnB>
+                    <a:lnTlToBr w="12700" cmpd="sng">
+                      <a:noFill/>
+                      <a:prstDash val="solid"/>
+                    </a:lnTlToBr>
+                    <a:lnBlToTr w="12700" cmpd="sng">
+                      <a:noFill/>
+                      <a:prstDash val="solid"/>
+                    </a:lnBlToTr>
+                    <a:noFill/>
+                  </a:tcPr>
+                </a:tc>
+                <a:tc>
+                  <a:txBody>
+                    <a:bodyPr/>
+                    <a:lstStyle/>
+                    <a:p>
+                      <a:endParaRPr lang="en-GB" b="1" dirty="0">
+                        <a:solidFill>
+                          <a:schemeClr val="tx1"/>
+                        </a:solidFill>
+                      </a:endParaRPr>
+                    </a:p>
+                  </a:txBody>
+                  <a:tcPr>
+                    <a:lnL w="12700" cmpd="sng">
+                      <a:noFill/>
+                    </a:lnL>
+                    <a:lnR w="12700" cmpd="sng">
+                      <a:noFill/>
+                    </a:lnR>
+                    <a:lnT w="12700" cmpd="sng">
+                      <a:noFill/>
+                    </a:lnT>
+                    <a:lnB w="12700" cmpd="sng">
+                      <a:noFill/>
+                    </a:lnB>
+                    <a:lnTlToBr w="12700" cmpd="sng">
+                      <a:noFill/>
+                      <a:prstDash val="solid"/>
+                    </a:lnTlToBr>
+                    <a:lnBlToTr w="12700" cmpd="sng">
+                      <a:noFill/>
+                      <a:prstDash val="solid"/>
+                    </a:lnBlToTr>
+                    <a:noFill/>
+                  </a:tcPr>
+                </a:tc>
+                <a:tc>
+                  <a:txBody>
+                    <a:bodyPr/>
+                    <a:lstStyle/>
+                    <a:p>
+                      <a:r>
+                        <a:rPr lang="en-GB" b="1" dirty="0" smtClean="0">
+                          <a:solidFill>
+                            <a:schemeClr val="tx1"/>
+                          </a:solidFill>
+                        </a:rPr>
+                        <a:t>Whole control unit</a:t>
+                      </a:r>
+                      <a:endParaRPr lang="en-GB" b="1" dirty="0">
+                        <a:solidFill>
+                          <a:schemeClr val="tx1"/>
+                        </a:solidFill>
+                      </a:endParaRPr>
+                    </a:p>
+                  </a:txBody>
+                  <a:tcPr>
+                    <a:lnL w="12700" cmpd="sng">
+                      <a:noFill/>
+                    </a:lnL>
+                    <a:lnR w="12700" cmpd="sng">
+                      <a:noFill/>
+                    </a:lnR>
+                    <a:lnT w="12700" cmpd="sng">
+                      <a:noFill/>
+                    </a:lnT>
+                    <a:lnB w="12700" cmpd="sng">
+                      <a:noFill/>
+                    </a:lnB>
+                    <a:lnTlToBr w="12700" cmpd="sng">
+                      <a:noFill/>
+                      <a:prstDash val="solid"/>
+                    </a:lnTlToBr>
+                    <a:lnBlToTr w="12700" cmpd="sng">
+                      <a:noFill/>
+                      <a:prstDash val="solid"/>
+                    </a:lnBlToTr>
+                    <a:noFill/>
+                  </a:tcPr>
+                </a:tc>
+                <a:tc>
+                  <a:txBody>
+                    <a:bodyPr/>
+                    <a:lstStyle/>
+                    <a:p>
+                      <a:endParaRPr lang="en-GB" b="1" dirty="0">
+                        <a:solidFill>
+                          <a:schemeClr val="tx1"/>
+                        </a:solidFill>
+                      </a:endParaRPr>
+                    </a:p>
+                  </a:txBody>
+                  <a:tcPr>
+                    <a:lnL w="12700" cmpd="sng">
+                      <a:noFill/>
+                    </a:lnL>
+                    <a:lnR w="12700" cmpd="sng">
+                      <a:noFill/>
+                    </a:lnR>
+                    <a:lnT w="12700" cmpd="sng">
+                      <a:noFill/>
+                    </a:lnT>
+                    <a:lnB w="12700" cmpd="sng">
+                      <a:noFill/>
+                    </a:lnB>
+                    <a:lnTlToBr w="12700" cmpd="sng">
+                      <a:noFill/>
+                      <a:prstDash val="solid"/>
+                    </a:lnTlToBr>
+                    <a:lnBlToTr w="12700" cmpd="sng">
+                      <a:noFill/>
+                      <a:prstDash val="solid"/>
+                    </a:lnBlToTr>
+                    <a:noFill/>
+                  </a:tcPr>
+                </a:tc>
+                <a:tc>
+                  <a:txBody>
+                    <a:bodyPr/>
+                    <a:lstStyle/>
+                    <a:p>
+                      <a:endParaRPr lang="en-GB" b="1">
+                        <a:solidFill>
+                          <a:schemeClr val="tx1"/>
+                        </a:solidFill>
+                      </a:endParaRPr>
+                    </a:p>
+                  </a:txBody>
+                  <a:tcPr>
+                    <a:lnL w="12700" cmpd="sng">
+                      <a:noFill/>
+                    </a:lnL>
+                    <a:lnR w="12700" cmpd="sng">
+                      <a:noFill/>
+                    </a:lnR>
+                    <a:lnT w="12700" cmpd="sng">
+                      <a:noFill/>
+                    </a:lnT>
+                    <a:lnB w="12700" cmpd="sng">
+                      <a:noFill/>
+                    </a:lnB>
+                    <a:lnTlToBr w="12700" cmpd="sng">
+                      <a:noFill/>
+                      <a:prstDash val="solid"/>
+                    </a:lnTlToBr>
+                    <a:lnBlToTr w="12700" cmpd="sng">
+                      <a:noFill/>
+                      <a:prstDash val="solid"/>
+                    </a:lnBlToTr>
+                    <a:noFill/>
+                  </a:tcPr>
+                </a:tc>
+                <a:tc>
+                  <a:txBody>
+                    <a:bodyPr/>
+                    <a:lstStyle/>
+                    <a:p>
+                      <a:r>
+                        <a:rPr lang="en-GB" b="1" dirty="0" smtClean="0">
+                          <a:solidFill>
+                            <a:schemeClr val="tx1"/>
+                          </a:solidFill>
+                        </a:rPr>
+                        <a:t>Computer</a:t>
+                      </a:r>
+                      <a:endParaRPr lang="en-GB" b="1" dirty="0">
+                        <a:solidFill>
+                          <a:schemeClr val="tx1"/>
+                        </a:solidFill>
+                      </a:endParaRPr>
+                    </a:p>
+                  </a:txBody>
+                  <a:tcPr>
+                    <a:lnL w="12700" cmpd="sng">
+                      <a:noFill/>
+                    </a:lnL>
+                    <a:lnR w="12700" cmpd="sng">
+                      <a:noFill/>
+                    </a:lnR>
+                    <a:lnT w="12700" cmpd="sng">
+                      <a:noFill/>
+                    </a:lnT>
+                    <a:lnB w="12700" cmpd="sng">
+                      <a:noFill/>
+                    </a:lnB>
+                    <a:lnTlToBr w="12700" cmpd="sng">
+                      <a:noFill/>
+                      <a:prstDash val="solid"/>
+                    </a:lnTlToBr>
+                    <a:lnBlToTr w="12700" cmpd="sng">
+                      <a:noFill/>
+                      <a:prstDash val="solid"/>
+                    </a:lnBlToTr>
+                    <a:noFill/>
+                  </a:tcPr>
+                </a:tc>
+                <a:tc>
+                  <a:txBody>
+                    <a:bodyPr/>
+                    <a:lstStyle/>
+                    <a:p>
+                      <a:endParaRPr lang="en-GB" b="1" dirty="0">
+                        <a:solidFill>
+                          <a:schemeClr val="tx1"/>
+                        </a:solidFill>
+                      </a:endParaRPr>
+                    </a:p>
+                  </a:txBody>
+                  <a:tcPr>
+                    <a:lnL w="12700" cmpd="sng">
+                      <a:noFill/>
+                    </a:lnL>
+                    <a:lnR w="12700" cmpd="sng">
+                      <a:noFill/>
+                    </a:lnR>
+                    <a:lnT w="12700" cmpd="sng">
+                      <a:noFill/>
+                    </a:lnT>
+                    <a:lnB w="12700" cmpd="sng">
+                      <a:noFill/>
+                    </a:lnB>
+                    <a:lnTlToBr w="12700" cmpd="sng">
+                      <a:noFill/>
+                      <a:prstDash val="solid"/>
+                    </a:lnTlToBr>
+                    <a:lnBlToTr w="12700" cmpd="sng">
+                      <a:noFill/>
+                      <a:prstDash val="solid"/>
+                    </a:lnBlToTr>
+                    <a:noFill/>
+                  </a:tcPr>
+                </a:tc>
+                <a:tc>
+                  <a:txBody>
+                    <a:bodyPr/>
+                    <a:lstStyle/>
+                    <a:p>
+                      <a:endParaRPr lang="en-GB" b="1" dirty="0">
+                        <a:solidFill>
+                          <a:schemeClr val="tx1"/>
+                        </a:solidFill>
+                      </a:endParaRPr>
+                    </a:p>
+                  </a:txBody>
+                  <a:tcPr>
+                    <a:lnL w="12700" cmpd="sng">
+                      <a:noFill/>
+                    </a:lnL>
+                    <a:lnR w="12700" cmpd="sng">
+                      <a:noFill/>
+                    </a:lnR>
+                    <a:lnT w="12700" cmpd="sng">
+                      <a:noFill/>
+                    </a:lnT>
+                    <a:lnB w="12700" cmpd="sng">
+                      <a:noFill/>
+                    </a:lnB>
+                    <a:lnTlToBr w="12700" cmpd="sng">
+                      <a:noFill/>
+                      <a:prstDash val="solid"/>
+                    </a:lnTlToBr>
+                    <a:lnBlToTr w="12700" cmpd="sng">
+                      <a:noFill/>
+                      <a:prstDash val="solid"/>
+                    </a:lnBlToTr>
+                    <a:noFill/>
+                  </a:tcPr>
+                </a:tc>
+                <a:tc>
+                  <a:txBody>
+                    <a:bodyPr/>
+                    <a:lstStyle/>
+                    <a:p>
+                      <a:endParaRPr lang="en-GB" b="1" dirty="0">
+                        <a:solidFill>
+                          <a:schemeClr val="tx1"/>
+                        </a:solidFill>
+                      </a:endParaRPr>
+                    </a:p>
+                  </a:txBody>
+                  <a:tcPr>
+                    <a:lnL w="12700" cmpd="sng">
+                      <a:noFill/>
+                    </a:lnL>
+                    <a:lnR w="12700" cmpd="sng">
+                      <a:noFill/>
+                    </a:lnR>
+                    <a:lnT w="12700" cmpd="sng">
+                      <a:noFill/>
+                    </a:lnT>
+                    <a:lnB w="12700" cmpd="sng">
+                      <a:noFill/>
+                    </a:lnB>
+                    <a:lnTlToBr w="12700" cmpd="sng">
+                      <a:noFill/>
+                      <a:prstDash val="solid"/>
+                    </a:lnTlToBr>
+                    <a:lnBlToTr w="12700" cmpd="sng">
+                      <a:noFill/>
+                      <a:prstDash val="solid"/>
+                    </a:lnBlToTr>
+                    <a:noFill/>
+                  </a:tcPr>
+                </a:tc>
+              </a:tr>
+              <a:tr h="991682">
+                <a:tc>
+                  <a:txBody>
+                    <a:bodyPr/>
+                    <a:lstStyle/>
+                    <a:p>
+                      <a:endParaRPr lang="en-GB" b="1" dirty="0">
+                        <a:solidFill>
+                          <a:schemeClr val="tx1"/>
+                        </a:solidFill>
+                      </a:endParaRPr>
+                    </a:p>
+                  </a:txBody>
+                  <a:tcPr>
+                    <a:lnL w="12700" cmpd="sng">
+                      <a:noFill/>
+                    </a:lnL>
+                    <a:lnR w="12700" cmpd="sng">
+                      <a:noFill/>
+                    </a:lnR>
+                    <a:lnT w="12700" cmpd="sng">
+                      <a:noFill/>
+                    </a:lnT>
+                    <a:lnB w="12700" cmpd="sng">
+                      <a:noFill/>
+                    </a:lnB>
+                    <a:lnTlToBr w="12700" cmpd="sng">
+                      <a:noFill/>
+                      <a:prstDash val="solid"/>
+                    </a:lnTlToBr>
+                    <a:lnBlToTr w="12700" cmpd="sng">
+                      <a:noFill/>
+                      <a:prstDash val="solid"/>
+                    </a:lnBlToTr>
+                    <a:noFill/>
+                  </a:tcPr>
+                </a:tc>
+                <a:tc>
+                  <a:txBody>
+                    <a:bodyPr/>
+                    <a:lstStyle/>
+                    <a:p>
+                      <a:endParaRPr lang="en-GB" b="1">
+                        <a:solidFill>
+                          <a:schemeClr val="tx1"/>
+                        </a:solidFill>
+                      </a:endParaRPr>
+                    </a:p>
+                  </a:txBody>
+                  <a:tcPr>
+                    <a:lnL w="12700" cmpd="sng">
+                      <a:noFill/>
+                    </a:lnL>
+                    <a:lnR w="12700" cmpd="sng">
+                      <a:noFill/>
+                    </a:lnR>
+                    <a:lnT w="12700" cmpd="sng">
+                      <a:noFill/>
+                    </a:lnT>
+                    <a:lnB w="12700" cmpd="sng">
+                      <a:noFill/>
+                    </a:lnB>
+                    <a:lnTlToBr w="12700" cmpd="sng">
+                      <a:noFill/>
+                      <a:prstDash val="solid"/>
+                    </a:lnTlToBr>
+                    <a:lnBlToTr w="12700" cmpd="sng">
+                      <a:noFill/>
+                      <a:prstDash val="solid"/>
+                    </a:lnBlToTr>
+                    <a:noFill/>
+                  </a:tcPr>
+                </a:tc>
+                <a:tc>
+                  <a:txBody>
+                    <a:bodyPr/>
+                    <a:lstStyle/>
+                    <a:p>
+                      <a:endParaRPr lang="en-GB" b="1" dirty="0">
+                        <a:solidFill>
+                          <a:schemeClr val="tx1"/>
+                        </a:solidFill>
+                      </a:endParaRPr>
+                    </a:p>
+                  </a:txBody>
+                  <a:tcPr>
+                    <a:lnL w="12700" cmpd="sng">
+                      <a:noFill/>
+                    </a:lnL>
+                    <a:lnR w="12700" cmpd="sng">
+                      <a:noFill/>
+                    </a:lnR>
+                    <a:lnT w="12700" cmpd="sng">
+                      <a:noFill/>
+                    </a:lnT>
+                    <a:lnB w="12700" cmpd="sng">
+                      <a:noFill/>
+                    </a:lnB>
+                    <a:lnTlToBr w="12700" cmpd="sng">
+                      <a:noFill/>
+                      <a:prstDash val="solid"/>
+                    </a:lnTlToBr>
+                    <a:lnBlToTr w="12700" cmpd="sng">
+                      <a:noFill/>
+                      <a:prstDash val="solid"/>
+                    </a:lnBlToTr>
+                    <a:noFill/>
+                  </a:tcPr>
+                </a:tc>
+                <a:tc>
+                  <a:txBody>
+                    <a:bodyPr/>
+                    <a:lstStyle/>
+                    <a:p>
+                      <a:r>
+                        <a:rPr lang="en-GB" b="1" dirty="0" smtClean="0">
+                          <a:solidFill>
+                            <a:schemeClr val="tx1"/>
+                          </a:solidFill>
+                        </a:rPr>
+                        <a:t>Cathode</a:t>
+                      </a:r>
+                      <a:r>
+                        <a:rPr lang="en-GB" b="1" baseline="0" dirty="0" smtClean="0">
+                          <a:solidFill>
+                            <a:schemeClr val="tx1"/>
+                          </a:solidFill>
+                        </a:rPr>
+                        <a:t> ray tubes</a:t>
+                      </a:r>
+                      <a:endParaRPr lang="en-GB" b="1" dirty="0">
+                        <a:solidFill>
+                          <a:schemeClr val="tx1"/>
+                        </a:solidFill>
+                      </a:endParaRPr>
+                    </a:p>
+                  </a:txBody>
+                  <a:tcPr>
+                    <a:lnL w="12700" cmpd="sng">
+                      <a:noFill/>
+                    </a:lnL>
+                    <a:lnR w="12700" cmpd="sng">
+                      <a:noFill/>
+                    </a:lnR>
+                    <a:lnT w="12700" cmpd="sng">
+                      <a:noFill/>
+                    </a:lnT>
+                    <a:lnB w="12700" cmpd="sng">
+                      <a:noFill/>
+                    </a:lnB>
+                    <a:lnTlToBr w="12700" cmpd="sng">
+                      <a:noFill/>
+                      <a:prstDash val="solid"/>
+                    </a:lnTlToBr>
+                    <a:lnBlToTr w="12700" cmpd="sng">
+                      <a:noFill/>
+                      <a:prstDash val="solid"/>
+                    </a:lnBlToTr>
+                    <a:noFill/>
+                  </a:tcPr>
+                </a:tc>
+                <a:tc>
+                  <a:txBody>
+                    <a:bodyPr/>
+                    <a:lstStyle/>
+                    <a:p>
+                      <a:endParaRPr lang="en-GB" b="1" dirty="0">
+                        <a:solidFill>
+                          <a:schemeClr val="tx1"/>
+                        </a:solidFill>
+                      </a:endParaRPr>
+                    </a:p>
+                  </a:txBody>
+                  <a:tcPr>
+                    <a:lnL w="12700" cmpd="sng">
+                      <a:noFill/>
+                    </a:lnL>
+                    <a:lnR w="12700" cmpd="sng">
+                      <a:noFill/>
+                    </a:lnR>
+                    <a:lnT w="12700" cmpd="sng">
+                      <a:noFill/>
+                    </a:lnT>
+                    <a:lnB w="12700" cmpd="sng">
+                      <a:noFill/>
+                    </a:lnB>
+                    <a:lnTlToBr w="12700" cmpd="sng">
+                      <a:noFill/>
+                      <a:prstDash val="solid"/>
+                    </a:lnTlToBr>
+                    <a:lnBlToTr w="12700" cmpd="sng">
+                      <a:noFill/>
+                      <a:prstDash val="solid"/>
+                    </a:lnBlToTr>
+                    <a:noFill/>
+                  </a:tcPr>
+                </a:tc>
+                <a:tc>
+                  <a:txBody>
+                    <a:bodyPr/>
+                    <a:lstStyle/>
+                    <a:p>
+                      <a:endParaRPr lang="en-GB" b="1">
+                        <a:solidFill>
+                          <a:schemeClr val="tx1"/>
+                        </a:solidFill>
+                      </a:endParaRPr>
+                    </a:p>
+                  </a:txBody>
+                  <a:tcPr>
+                    <a:lnL w="12700" cmpd="sng">
+                      <a:noFill/>
+                    </a:lnL>
+                    <a:lnR w="12700" cmpd="sng">
+                      <a:noFill/>
+                    </a:lnR>
+                    <a:lnT w="12700" cmpd="sng">
+                      <a:noFill/>
+                    </a:lnT>
+                    <a:lnB w="12700" cmpd="sng">
+                      <a:noFill/>
+                    </a:lnB>
+                    <a:lnTlToBr w="12700" cmpd="sng">
+                      <a:noFill/>
+                      <a:prstDash val="solid"/>
+                    </a:lnTlToBr>
+                    <a:lnBlToTr w="12700" cmpd="sng">
+                      <a:noFill/>
+                      <a:prstDash val="solid"/>
+                    </a:lnBlToTr>
+                    <a:noFill/>
+                  </a:tcPr>
+                </a:tc>
+                <a:tc>
+                  <a:txBody>
+                    <a:bodyPr/>
+                    <a:lstStyle/>
+                    <a:p>
+                      <a:r>
+                        <a:rPr lang="en-GB" b="1" dirty="0" smtClean="0">
+                          <a:solidFill>
+                            <a:schemeClr val="tx1"/>
+                          </a:solidFill>
+                        </a:rPr>
+                        <a:t>View coffin</a:t>
+                      </a:r>
+                      <a:endParaRPr lang="en-GB" b="1" dirty="0">
+                        <a:solidFill>
+                          <a:schemeClr val="tx1"/>
+                        </a:solidFill>
+                      </a:endParaRPr>
+                    </a:p>
+                  </a:txBody>
+                  <a:tcPr>
+                    <a:lnL w="12700" cmpd="sng">
+                      <a:noFill/>
+                    </a:lnL>
+                    <a:lnR w="12700" cmpd="sng">
+                      <a:noFill/>
+                    </a:lnR>
+                    <a:lnT w="12700" cmpd="sng">
+                      <a:noFill/>
+                    </a:lnT>
+                    <a:lnB w="12700" cmpd="sng">
+                      <a:noFill/>
+                    </a:lnB>
+                    <a:lnTlToBr w="12700" cmpd="sng">
+                      <a:noFill/>
+                      <a:prstDash val="solid"/>
+                    </a:lnTlToBr>
+                    <a:lnBlToTr w="12700" cmpd="sng">
+                      <a:noFill/>
+                      <a:prstDash val="solid"/>
+                    </a:lnBlToTr>
+                    <a:noFill/>
+                  </a:tcPr>
+                </a:tc>
+                <a:tc>
+                  <a:txBody>
+                    <a:bodyPr/>
+                    <a:lstStyle/>
+                    <a:p>
+                      <a:endParaRPr lang="en-GB" b="1" dirty="0">
+                        <a:solidFill>
+                          <a:schemeClr val="tx1"/>
+                        </a:solidFill>
+                      </a:endParaRPr>
+                    </a:p>
+                  </a:txBody>
+                  <a:tcPr>
+                    <a:lnL w="12700" cmpd="sng">
+                      <a:noFill/>
+                    </a:lnL>
+                    <a:lnR w="12700" cmpd="sng">
+                      <a:noFill/>
+                    </a:lnR>
+                    <a:lnT w="12700" cmpd="sng">
+                      <a:noFill/>
+                    </a:lnT>
+                    <a:lnB w="12700" cmpd="sng">
+                      <a:noFill/>
+                    </a:lnB>
+                    <a:lnTlToBr w="12700" cmpd="sng">
+                      <a:noFill/>
+                      <a:prstDash val="solid"/>
+                    </a:lnTlToBr>
+                    <a:lnBlToTr w="12700" cmpd="sng">
+                      <a:noFill/>
+                      <a:prstDash val="solid"/>
+                    </a:lnBlToTr>
+                    <a:noFill/>
+                  </a:tcPr>
+                </a:tc>
+                <a:tc>
+                  <a:txBody>
+                    <a:bodyPr/>
+                    <a:lstStyle/>
+                    <a:p>
+                      <a:endParaRPr lang="en-GB" b="1" dirty="0">
+                        <a:solidFill>
+                          <a:schemeClr val="tx1"/>
+                        </a:solidFill>
+                      </a:endParaRPr>
+                    </a:p>
+                  </a:txBody>
+                  <a:tcPr>
+                    <a:lnL w="12700" cmpd="sng">
+                      <a:noFill/>
+                    </a:lnL>
+                    <a:lnR w="12700" cmpd="sng">
+                      <a:noFill/>
+                    </a:lnR>
+                    <a:lnT w="12700" cmpd="sng">
+                      <a:noFill/>
+                    </a:lnT>
+                    <a:lnB w="12700" cmpd="sng">
+                      <a:noFill/>
+                    </a:lnB>
+                    <a:lnTlToBr w="12700" cmpd="sng">
+                      <a:noFill/>
+                      <a:prstDash val="solid"/>
+                    </a:lnTlToBr>
+                    <a:lnBlToTr w="12700" cmpd="sng">
+                      <a:noFill/>
+                      <a:prstDash val="solid"/>
+                    </a:lnBlToTr>
+                    <a:noFill/>
+                  </a:tcPr>
+                </a:tc>
+                <a:tc>
+                  <a:txBody>
+                    <a:bodyPr/>
+                    <a:lstStyle/>
+                    <a:p>
+                      <a:endParaRPr lang="en-GB" b="1">
+                        <a:solidFill>
+                          <a:schemeClr val="tx1"/>
+                        </a:solidFill>
+                      </a:endParaRPr>
+                    </a:p>
+                  </a:txBody>
+                  <a:tcPr>
+                    <a:lnL w="12700" cmpd="sng">
+                      <a:noFill/>
+                    </a:lnL>
+                    <a:lnR w="12700" cmpd="sng">
+                      <a:noFill/>
+                    </a:lnR>
+                    <a:lnT w="12700" cmpd="sng">
+                      <a:noFill/>
+                    </a:lnT>
+                    <a:lnB w="12700" cmpd="sng">
+                      <a:noFill/>
+                    </a:lnB>
+                    <a:lnTlToBr w="12700" cmpd="sng">
+                      <a:noFill/>
+                      <a:prstDash val="solid"/>
+                    </a:lnTlToBr>
+                    <a:lnBlToTr w="12700" cmpd="sng">
+                      <a:noFill/>
+                      <a:prstDash val="solid"/>
+                    </a:lnBlToTr>
+                    <a:noFill/>
+                  </a:tcPr>
+                </a:tc>
+              </a:tr>
+              <a:tr h="991682">
+                <a:tc>
+                  <a:txBody>
+                    <a:bodyPr/>
+                    <a:lstStyle/>
+                    <a:p>
+                      <a:r>
+                        <a:rPr lang="en-GB" b="1" dirty="0" smtClean="0">
+                          <a:solidFill>
+                            <a:schemeClr val="tx1"/>
+                          </a:solidFill>
+                        </a:rPr>
+                        <a:t>Table with tape</a:t>
+                      </a:r>
+                      <a:endParaRPr lang="en-GB" b="1" dirty="0">
+                        <a:solidFill>
+                          <a:schemeClr val="tx1"/>
+                        </a:solidFill>
+                      </a:endParaRPr>
+                    </a:p>
+                  </a:txBody>
+                  <a:tcPr>
+                    <a:lnL w="12700" cmpd="sng">
+                      <a:noFill/>
+                    </a:lnL>
+                    <a:lnR w="12700" cmpd="sng">
+                      <a:noFill/>
+                    </a:lnR>
+                    <a:lnT w="12700" cmpd="sng">
+                      <a:noFill/>
+                    </a:lnT>
+                    <a:lnB w="12700" cmpd="sng">
+                      <a:noFill/>
+                    </a:lnB>
+                    <a:lnTlToBr w="12700" cmpd="sng">
+                      <a:noFill/>
+                      <a:prstDash val="solid"/>
+                    </a:lnTlToBr>
+                    <a:lnBlToTr w="12700" cmpd="sng">
+                      <a:noFill/>
+                      <a:prstDash val="solid"/>
+                    </a:lnBlToTr>
+                    <a:noFill/>
+                  </a:tcPr>
+                </a:tc>
+                <a:tc>
+                  <a:txBody>
+                    <a:bodyPr/>
+                    <a:lstStyle/>
+                    <a:p>
+                      <a:endParaRPr lang="en-GB" b="1" dirty="0">
+                        <a:solidFill>
+                          <a:schemeClr val="tx1"/>
+                        </a:solidFill>
+                      </a:endParaRPr>
+                    </a:p>
+                  </a:txBody>
+                  <a:tcPr>
+                    <a:lnL w="12700" cmpd="sng">
+                      <a:noFill/>
+                    </a:lnL>
+                    <a:lnR w="12700" cmpd="sng">
+                      <a:noFill/>
+                    </a:lnR>
+                    <a:lnT w="12700" cmpd="sng">
+                      <a:noFill/>
+                    </a:lnT>
+                    <a:lnB w="12700" cmpd="sng">
+                      <a:noFill/>
+                    </a:lnB>
+                    <a:lnTlToBr w="12700" cmpd="sng">
+                      <a:noFill/>
+                      <a:prstDash val="solid"/>
+                    </a:lnTlToBr>
+                    <a:lnBlToTr w="12700" cmpd="sng">
+                      <a:noFill/>
+                      <a:prstDash val="solid"/>
+                    </a:lnBlToTr>
+                    <a:noFill/>
+                  </a:tcPr>
+                </a:tc>
+                <a:tc>
+                  <a:txBody>
+                    <a:bodyPr/>
+                    <a:lstStyle/>
+                    <a:p>
+                      <a:r>
+                        <a:rPr lang="en-GB" b="1" dirty="0" err="1" smtClean="0">
+                          <a:solidFill>
+                            <a:schemeClr val="tx1"/>
+                          </a:solidFill>
+                        </a:rPr>
+                        <a:t>Uniselectors</a:t>
+                      </a:r>
+                      <a:r>
+                        <a:rPr lang="en-GB" b="1" baseline="0" dirty="0" smtClean="0">
+                          <a:solidFill>
+                            <a:schemeClr val="tx1"/>
+                          </a:solidFill>
+                        </a:rPr>
+                        <a:t> in front row</a:t>
+                      </a:r>
+                      <a:endParaRPr lang="en-GB" b="1" dirty="0">
+                        <a:solidFill>
+                          <a:schemeClr val="tx1"/>
+                        </a:solidFill>
+                      </a:endParaRPr>
+                    </a:p>
+                  </a:txBody>
+                  <a:tcPr>
+                    <a:lnL w="12700" cmpd="sng">
+                      <a:noFill/>
+                    </a:lnL>
+                    <a:lnR w="12700" cmpd="sng">
+                      <a:noFill/>
+                    </a:lnR>
+                    <a:lnT w="12700" cmpd="sng">
+                      <a:noFill/>
+                    </a:lnT>
+                    <a:lnB w="12700" cmpd="sng">
+                      <a:noFill/>
+                    </a:lnB>
+                    <a:lnTlToBr w="12700" cmpd="sng">
+                      <a:noFill/>
+                      <a:prstDash val="solid"/>
+                    </a:lnTlToBr>
+                    <a:lnBlToTr w="12700" cmpd="sng">
+                      <a:noFill/>
+                      <a:prstDash val="solid"/>
+                    </a:lnBlToTr>
+                    <a:noFill/>
+                  </a:tcPr>
+                </a:tc>
+                <a:tc>
+                  <a:txBody>
+                    <a:bodyPr/>
+                    <a:lstStyle/>
+                    <a:p>
+                      <a:endParaRPr lang="en-GB" b="1" dirty="0">
+                        <a:solidFill>
+                          <a:schemeClr val="tx1"/>
+                        </a:solidFill>
+                      </a:endParaRPr>
+                    </a:p>
+                  </a:txBody>
+                  <a:tcPr>
+                    <a:lnL w="12700" cmpd="sng">
+                      <a:noFill/>
+                    </a:lnL>
+                    <a:lnR w="12700" cmpd="sng">
+                      <a:noFill/>
+                    </a:lnR>
+                    <a:lnT w="12700" cmpd="sng">
+                      <a:noFill/>
+                    </a:lnT>
+                    <a:lnB w="12700" cmpd="sng">
+                      <a:noFill/>
+                    </a:lnB>
+                    <a:lnTlToBr w="12700" cmpd="sng">
+                      <a:noFill/>
+                      <a:prstDash val="solid"/>
+                    </a:lnTlToBr>
+                    <a:lnBlToTr w="12700" cmpd="sng">
+                      <a:noFill/>
+                      <a:prstDash val="solid"/>
+                    </a:lnBlToTr>
+                    <a:noFill/>
+                  </a:tcPr>
+                </a:tc>
+                <a:tc>
+                  <a:txBody>
+                    <a:bodyPr/>
+                    <a:lstStyle/>
+                    <a:p>
+                      <a:endParaRPr lang="en-GB" b="1">
+                        <a:solidFill>
+                          <a:schemeClr val="tx1"/>
+                        </a:solidFill>
+                      </a:endParaRPr>
+                    </a:p>
+                  </a:txBody>
+                  <a:tcPr>
+                    <a:lnL w="12700" cmpd="sng">
+                      <a:noFill/>
+                    </a:lnL>
+                    <a:lnR w="12700" cmpd="sng">
+                      <a:noFill/>
+                    </a:lnR>
+                    <a:lnT w="12700" cmpd="sng">
+                      <a:noFill/>
+                    </a:lnT>
+                    <a:lnB w="12700" cmpd="sng">
+                      <a:noFill/>
+                    </a:lnB>
+                    <a:lnTlToBr w="12700" cmpd="sng">
+                      <a:noFill/>
+                      <a:prstDash val="solid"/>
+                    </a:lnTlToBr>
+                    <a:lnBlToTr w="12700" cmpd="sng">
+                      <a:noFill/>
+                      <a:prstDash val="solid"/>
+                    </a:lnBlToTr>
+                    <a:noFill/>
+                  </a:tcPr>
+                </a:tc>
+                <a:tc>
+                  <a:txBody>
+                    <a:bodyPr/>
+                    <a:lstStyle/>
+                    <a:p>
+                      <a:endParaRPr lang="en-GB" b="1">
+                        <a:solidFill>
+                          <a:schemeClr val="tx1"/>
+                        </a:solidFill>
+                      </a:endParaRPr>
+                    </a:p>
+                  </a:txBody>
+                  <a:tcPr>
+                    <a:lnL w="12700" cmpd="sng">
+                      <a:noFill/>
+                    </a:lnL>
+                    <a:lnR w="12700" cmpd="sng">
+                      <a:noFill/>
+                    </a:lnR>
+                    <a:lnT w="12700" cmpd="sng">
+                      <a:noFill/>
+                    </a:lnT>
+                    <a:lnB w="12700" cmpd="sng">
+                      <a:noFill/>
+                    </a:lnB>
+                    <a:lnTlToBr w="12700" cmpd="sng">
+                      <a:noFill/>
+                      <a:prstDash val="solid"/>
+                    </a:lnTlToBr>
+                    <a:lnBlToTr w="12700" cmpd="sng">
+                      <a:noFill/>
+                      <a:prstDash val="solid"/>
+                    </a:lnBlToTr>
+                    <a:noFill/>
+                  </a:tcPr>
+                </a:tc>
+                <a:tc>
+                  <a:txBody>
+                    <a:bodyPr/>
+                    <a:lstStyle/>
+                    <a:p>
+                      <a:r>
+                        <a:rPr lang="en-GB" b="1" dirty="0" smtClean="0">
+                          <a:solidFill>
+                            <a:schemeClr val="tx1"/>
+                          </a:solidFill>
+                        </a:rPr>
+                        <a:t>Pan storage regen units</a:t>
+                      </a:r>
+                      <a:endParaRPr lang="en-GB" b="1" dirty="0">
+                        <a:solidFill>
+                          <a:schemeClr val="tx1"/>
+                        </a:solidFill>
+                      </a:endParaRPr>
+                    </a:p>
+                  </a:txBody>
+                  <a:tcPr>
+                    <a:lnL w="12700" cmpd="sng">
+                      <a:noFill/>
+                    </a:lnL>
+                    <a:lnR w="12700" cmpd="sng">
+                      <a:noFill/>
+                    </a:lnR>
+                    <a:lnT w="12700" cmpd="sng">
+                      <a:noFill/>
+                    </a:lnT>
+                    <a:lnB w="12700" cmpd="sng">
+                      <a:noFill/>
+                    </a:lnB>
+                    <a:lnTlToBr w="12700" cmpd="sng">
+                      <a:noFill/>
+                      <a:prstDash val="solid"/>
+                    </a:lnTlToBr>
+                    <a:lnBlToTr w="12700" cmpd="sng">
+                      <a:noFill/>
+                      <a:prstDash val="solid"/>
+                    </a:lnBlToTr>
+                    <a:noFill/>
+                  </a:tcPr>
+                </a:tc>
+                <a:tc>
+                  <a:txBody>
+                    <a:bodyPr/>
+                    <a:lstStyle/>
+                    <a:p>
+                      <a:endParaRPr lang="en-GB" b="1" dirty="0">
+                        <a:solidFill>
+                          <a:schemeClr val="tx1"/>
+                        </a:solidFill>
+                      </a:endParaRPr>
+                    </a:p>
+                  </a:txBody>
+                  <a:tcPr>
+                    <a:lnL w="12700" cmpd="sng">
+                      <a:noFill/>
+                    </a:lnL>
+                    <a:lnR w="12700" cmpd="sng">
+                      <a:noFill/>
+                    </a:lnR>
+                    <a:lnT w="12700" cmpd="sng">
+                      <a:noFill/>
+                    </a:lnT>
+                    <a:lnB w="12700" cmpd="sng">
+                      <a:noFill/>
+                    </a:lnB>
+                    <a:lnTlToBr w="12700" cmpd="sng">
+                      <a:noFill/>
+                      <a:prstDash val="solid"/>
+                    </a:lnTlToBr>
+                    <a:lnBlToTr w="12700" cmpd="sng">
+                      <a:noFill/>
+                      <a:prstDash val="solid"/>
+                    </a:lnBlToTr>
+                    <a:noFill/>
+                  </a:tcPr>
+                </a:tc>
+                <a:tc>
+                  <a:txBody>
+                    <a:bodyPr/>
+                    <a:lstStyle/>
+                    <a:p>
+                      <a:r>
+                        <a:rPr lang="en-GB" b="1" dirty="0" smtClean="0">
+                          <a:solidFill>
+                            <a:schemeClr val="tx1"/>
+                          </a:solidFill>
+                        </a:rPr>
+                        <a:t>Clocks panels</a:t>
+                      </a:r>
+                      <a:endParaRPr lang="en-GB" b="1" dirty="0">
+                        <a:solidFill>
+                          <a:schemeClr val="tx1"/>
+                        </a:solidFill>
+                      </a:endParaRPr>
+                    </a:p>
+                  </a:txBody>
+                  <a:tcPr>
+                    <a:lnL w="12700" cmpd="sng">
+                      <a:noFill/>
+                    </a:lnL>
+                    <a:lnR w="12700" cmpd="sng">
+                      <a:noFill/>
+                    </a:lnR>
+                    <a:lnT w="12700" cmpd="sng">
+                      <a:noFill/>
+                    </a:lnT>
+                    <a:lnB w="12700" cmpd="sng">
+                      <a:noFill/>
+                    </a:lnB>
+                    <a:lnTlToBr w="12700" cmpd="sng">
+                      <a:noFill/>
+                      <a:prstDash val="solid"/>
+                    </a:lnTlToBr>
+                    <a:lnBlToTr w="12700" cmpd="sng">
+                      <a:noFill/>
+                      <a:prstDash val="solid"/>
+                    </a:lnBlToTr>
+                    <a:noFill/>
+                  </a:tcPr>
+                </a:tc>
+                <a:tc>
+                  <a:txBody>
+                    <a:bodyPr/>
+                    <a:lstStyle/>
+                    <a:p>
+                      <a:endParaRPr lang="en-GB" b="1" dirty="0">
+                        <a:solidFill>
+                          <a:schemeClr val="tx1"/>
+                        </a:solidFill>
+                      </a:endParaRPr>
+                    </a:p>
+                  </a:txBody>
+                  <a:tcPr>
+                    <a:lnL w="12700" cmpd="sng">
+                      <a:noFill/>
+                    </a:lnL>
+                    <a:lnR w="12700" cmpd="sng">
+                      <a:noFill/>
+                    </a:lnR>
+                    <a:lnT w="12700" cmpd="sng">
+                      <a:noFill/>
+                    </a:lnT>
+                    <a:lnB w="12700" cmpd="sng">
+                      <a:noFill/>
+                    </a:lnB>
+                    <a:lnTlToBr w="12700" cmpd="sng">
+                      <a:noFill/>
+                      <a:prstDash val="solid"/>
+                    </a:lnTlToBr>
+                    <a:lnBlToTr w="12700" cmpd="sng">
+                      <a:noFill/>
+                      <a:prstDash val="solid"/>
+                    </a:lnBlToTr>
+                    <a:noFill/>
+                  </a:tcPr>
+                </a:tc>
+              </a:tr>
+              <a:tr h="991682">
+                <a:tc>
+                  <a:txBody>
+                    <a:bodyPr/>
+                    <a:lstStyle/>
+                    <a:p>
+                      <a:endParaRPr lang="en-GB" b="1" dirty="0">
+                        <a:solidFill>
+                          <a:schemeClr val="tx1"/>
+                        </a:solidFill>
+                      </a:endParaRPr>
+                    </a:p>
+                  </a:txBody>
+                  <a:tcPr>
+                    <a:lnL w="12700" cmpd="sng">
+                      <a:noFill/>
+                    </a:lnL>
+                    <a:lnR w="12700" cmpd="sng">
+                      <a:noFill/>
+                    </a:lnR>
+                    <a:lnT w="12700" cmpd="sng">
+                      <a:noFill/>
+                    </a:lnT>
+                    <a:lnB w="12700" cmpd="sng">
+                      <a:noFill/>
+                    </a:lnB>
+                    <a:lnTlToBr w="12700" cmpd="sng">
+                      <a:noFill/>
+                      <a:prstDash val="solid"/>
+                    </a:lnTlToBr>
+                    <a:lnBlToTr w="12700" cmpd="sng">
+                      <a:noFill/>
+                      <a:prstDash val="solid"/>
+                    </a:lnBlToTr>
+                    <a:noFill/>
+                  </a:tcPr>
+                </a:tc>
+                <a:tc>
+                  <a:txBody>
+                    <a:bodyPr/>
+                    <a:lstStyle/>
+                    <a:p>
+                      <a:endParaRPr lang="en-GB" b="1" dirty="0">
+                        <a:solidFill>
+                          <a:schemeClr val="tx1"/>
+                        </a:solidFill>
+                      </a:endParaRPr>
+                    </a:p>
+                  </a:txBody>
+                  <a:tcPr>
+                    <a:lnL w="12700" cmpd="sng">
+                      <a:noFill/>
+                    </a:lnL>
+                    <a:lnR w="12700" cmpd="sng">
+                      <a:noFill/>
+                    </a:lnR>
+                    <a:lnT w="12700" cmpd="sng">
+                      <a:noFill/>
+                    </a:lnT>
+                    <a:lnB w="12700" cmpd="sng">
+                      <a:noFill/>
+                    </a:lnB>
+                    <a:lnTlToBr w="12700" cmpd="sng">
+                      <a:noFill/>
+                      <a:prstDash val="solid"/>
+                    </a:lnTlToBr>
+                    <a:lnBlToTr w="12700" cmpd="sng">
+                      <a:noFill/>
+                      <a:prstDash val="solid"/>
+                    </a:lnBlToTr>
+                    <a:noFill/>
+                  </a:tcPr>
+                </a:tc>
+                <a:tc>
+                  <a:txBody>
+                    <a:bodyPr/>
+                    <a:lstStyle/>
+                    <a:p>
+                      <a:endParaRPr lang="en-GB" b="1" dirty="0">
+                        <a:solidFill>
+                          <a:schemeClr val="tx1"/>
+                        </a:solidFill>
+                      </a:endParaRPr>
+                    </a:p>
+                  </a:txBody>
+                  <a:tcPr>
+                    <a:lnL w="12700" cmpd="sng">
+                      <a:noFill/>
+                    </a:lnL>
+                    <a:lnR w="12700" cmpd="sng">
+                      <a:noFill/>
+                    </a:lnR>
+                    <a:lnT w="12700" cmpd="sng">
+                      <a:noFill/>
+                    </a:lnT>
+                    <a:lnB w="12700" cmpd="sng">
+                      <a:noFill/>
+                    </a:lnB>
+                    <a:lnTlToBr w="12700" cmpd="sng">
+                      <a:noFill/>
+                      <a:prstDash val="solid"/>
+                    </a:lnTlToBr>
+                    <a:lnBlToTr w="12700" cmpd="sng">
+                      <a:noFill/>
+                      <a:prstDash val="solid"/>
+                    </a:lnBlToTr>
+                    <a:noFill/>
+                  </a:tcPr>
+                </a:tc>
+                <a:tc>
+                  <a:txBody>
+                    <a:bodyPr/>
+                    <a:lstStyle/>
+                    <a:p>
+                      <a:endParaRPr lang="en-GB" b="1" dirty="0">
+                        <a:solidFill>
+                          <a:schemeClr val="tx1"/>
+                        </a:solidFill>
+                      </a:endParaRPr>
+                    </a:p>
+                  </a:txBody>
+                  <a:tcPr>
+                    <a:lnL w="12700" cmpd="sng">
+                      <a:noFill/>
+                    </a:lnL>
+                    <a:lnR w="12700" cmpd="sng">
+                      <a:noFill/>
+                    </a:lnR>
+                    <a:lnT w="12700" cmpd="sng">
+                      <a:noFill/>
+                    </a:lnT>
+                    <a:lnB w="12700" cmpd="sng">
+                      <a:noFill/>
+                    </a:lnB>
+                    <a:lnTlToBr w="12700" cmpd="sng">
+                      <a:noFill/>
+                      <a:prstDash val="solid"/>
+                    </a:lnTlToBr>
+                    <a:lnBlToTr w="12700" cmpd="sng">
+                      <a:noFill/>
+                      <a:prstDash val="solid"/>
+                    </a:lnBlToTr>
+                    <a:noFill/>
+                  </a:tcPr>
+                </a:tc>
+                <a:tc>
+                  <a:txBody>
+                    <a:bodyPr/>
+                    <a:lstStyle/>
+                    <a:p>
+                      <a:endParaRPr lang="en-GB" b="1" dirty="0">
+                        <a:solidFill>
+                          <a:schemeClr val="tx1"/>
+                        </a:solidFill>
+                      </a:endParaRPr>
+                    </a:p>
+                  </a:txBody>
+                  <a:tcPr>
+                    <a:lnL w="12700" cmpd="sng">
+                      <a:noFill/>
+                    </a:lnL>
+                    <a:lnR w="12700" cmpd="sng">
+                      <a:noFill/>
+                    </a:lnR>
+                    <a:lnT w="12700" cmpd="sng">
+                      <a:noFill/>
+                    </a:lnT>
+                    <a:lnB w="12700" cmpd="sng">
+                      <a:noFill/>
+                    </a:lnB>
+                    <a:lnTlToBr w="12700" cmpd="sng">
+                      <a:noFill/>
+                      <a:prstDash val="solid"/>
+                    </a:lnTlToBr>
+                    <a:lnBlToTr w="12700" cmpd="sng">
+                      <a:noFill/>
+                      <a:prstDash val="solid"/>
+                    </a:lnBlToTr>
+                    <a:noFill/>
+                  </a:tcPr>
+                </a:tc>
+                <a:tc>
+                  <a:txBody>
+                    <a:bodyPr/>
+                    <a:lstStyle/>
+                    <a:p>
+                      <a:r>
+                        <a:rPr lang="en-GB" b="1" dirty="0" smtClean="0">
+                          <a:solidFill>
+                            <a:schemeClr val="tx1"/>
+                          </a:solidFill>
+                        </a:rPr>
+                        <a:t>Close-</a:t>
+                      </a:r>
+                      <a:r>
+                        <a:rPr lang="en-GB" b="1" dirty="0" err="1" smtClean="0">
+                          <a:solidFill>
+                            <a:schemeClr val="tx1"/>
+                          </a:solidFill>
+                        </a:rPr>
+                        <a:t>ish</a:t>
+                      </a:r>
+                      <a:r>
+                        <a:rPr lang="en-GB" b="1" baseline="0" dirty="0" smtClean="0">
+                          <a:solidFill>
+                            <a:schemeClr val="tx1"/>
+                          </a:solidFill>
+                        </a:rPr>
+                        <a:t> left view</a:t>
+                      </a:r>
+                      <a:endParaRPr lang="en-GB" b="1" dirty="0">
+                        <a:solidFill>
+                          <a:schemeClr val="tx1"/>
+                        </a:solidFill>
+                      </a:endParaRPr>
+                    </a:p>
+                  </a:txBody>
+                  <a:tcPr>
+                    <a:lnL w="12700" cmpd="sng">
+                      <a:noFill/>
+                    </a:lnL>
+                    <a:lnR w="12700" cmpd="sng">
+                      <a:noFill/>
+                    </a:lnR>
+                    <a:lnT w="12700" cmpd="sng">
+                      <a:noFill/>
+                    </a:lnT>
+                    <a:lnB w="12700" cmpd="sng">
+                      <a:noFill/>
+                    </a:lnB>
+                    <a:lnTlToBr w="12700" cmpd="sng">
+                      <a:noFill/>
+                      <a:prstDash val="solid"/>
+                    </a:lnTlToBr>
+                    <a:lnBlToTr w="12700" cmpd="sng">
+                      <a:noFill/>
+                      <a:prstDash val="solid"/>
+                    </a:lnBlToTr>
+                    <a:noFill/>
+                  </a:tcPr>
+                </a:tc>
+                <a:tc>
+                  <a:txBody>
+                    <a:bodyPr/>
+                    <a:lstStyle/>
+                    <a:p>
+                      <a:endParaRPr lang="en-GB" b="1" dirty="0">
+                        <a:solidFill>
+                          <a:schemeClr val="tx1"/>
+                        </a:solidFill>
+                      </a:endParaRPr>
+                    </a:p>
+                  </a:txBody>
+                  <a:tcPr>
+                    <a:lnL w="12700" cmpd="sng">
+                      <a:noFill/>
+                    </a:lnL>
+                    <a:lnR w="12700" cmpd="sng">
+                      <a:noFill/>
+                    </a:lnR>
+                    <a:lnT w="12700" cmpd="sng">
+                      <a:noFill/>
+                    </a:lnT>
+                    <a:lnB w="12700" cmpd="sng">
+                      <a:noFill/>
+                    </a:lnB>
+                    <a:lnTlToBr w="12700" cmpd="sng">
+                      <a:noFill/>
+                      <a:prstDash val="solid"/>
+                    </a:lnTlToBr>
+                    <a:lnBlToTr w="12700" cmpd="sng">
+                      <a:noFill/>
+                      <a:prstDash val="solid"/>
+                    </a:lnBlToTr>
+                    <a:noFill/>
+                  </a:tcPr>
+                </a:tc>
+                <a:tc>
+                  <a:txBody>
+                    <a:bodyPr/>
+                    <a:lstStyle/>
+                    <a:p>
+                      <a:endParaRPr lang="en-GB" b="1" dirty="0">
+                        <a:solidFill>
+                          <a:schemeClr val="tx1"/>
+                        </a:solidFill>
+                      </a:endParaRPr>
+                    </a:p>
+                  </a:txBody>
+                  <a:tcPr>
+                    <a:lnL w="12700" cmpd="sng">
+                      <a:noFill/>
+                    </a:lnL>
+                    <a:lnR w="12700" cmpd="sng">
+                      <a:noFill/>
+                    </a:lnR>
+                    <a:lnT w="12700" cmpd="sng">
+                      <a:noFill/>
+                    </a:lnT>
+                    <a:lnB w="12700" cmpd="sng">
+                      <a:noFill/>
+                    </a:lnB>
+                    <a:lnTlToBr w="12700" cmpd="sng">
+                      <a:noFill/>
+                      <a:prstDash val="solid"/>
+                    </a:lnTlToBr>
+                    <a:lnBlToTr w="12700" cmpd="sng">
+                      <a:noFill/>
+                      <a:prstDash val="solid"/>
+                    </a:lnBlToTr>
+                    <a:noFill/>
+                  </a:tcPr>
+                </a:tc>
+                <a:tc>
+                  <a:txBody>
+                    <a:bodyPr/>
+                    <a:lstStyle/>
+                    <a:p>
+                      <a:endParaRPr lang="en-GB" b="1" dirty="0">
+                        <a:solidFill>
+                          <a:schemeClr val="tx1"/>
+                        </a:solidFill>
+                      </a:endParaRPr>
+                    </a:p>
+                  </a:txBody>
+                  <a:tcPr>
+                    <a:lnL w="12700" cmpd="sng">
+                      <a:noFill/>
+                    </a:lnL>
+                    <a:lnR w="12700" cmpd="sng">
+                      <a:noFill/>
+                    </a:lnR>
+                    <a:lnT w="12700" cmpd="sng">
+                      <a:noFill/>
+                    </a:lnT>
+                    <a:lnB w="12700" cmpd="sng">
+                      <a:noFill/>
+                    </a:lnB>
+                    <a:lnTlToBr w="12700" cmpd="sng">
+                      <a:noFill/>
+                      <a:prstDash val="solid"/>
+                    </a:lnTlToBr>
+                    <a:lnBlToTr w="12700" cmpd="sng">
+                      <a:noFill/>
+                      <a:prstDash val="solid"/>
+                    </a:lnBlToTr>
+                    <a:noFill/>
+                  </a:tcPr>
+                </a:tc>
+                <a:tc>
+                  <a:txBody>
+                    <a:bodyPr/>
+                    <a:lstStyle/>
+                    <a:p>
+                      <a:endParaRPr lang="en-GB" b="1">
+                        <a:solidFill>
+                          <a:schemeClr val="tx1"/>
+                        </a:solidFill>
+                      </a:endParaRPr>
+                    </a:p>
+                  </a:txBody>
+                  <a:tcPr>
+                    <a:lnL w="12700" cmpd="sng">
+                      <a:noFill/>
+                    </a:lnL>
+                    <a:lnR w="12700" cmpd="sng">
+                      <a:noFill/>
+                    </a:lnR>
+                    <a:lnT w="12700" cmpd="sng">
+                      <a:noFill/>
+                    </a:lnT>
+                    <a:lnB w="12700" cmpd="sng">
+                      <a:noFill/>
+                    </a:lnB>
+                    <a:lnTlToBr w="12700" cmpd="sng">
+                      <a:noFill/>
+                      <a:prstDash val="solid"/>
+                    </a:lnTlToBr>
+                    <a:lnBlToTr w="12700" cmpd="sng">
+                      <a:noFill/>
+                      <a:prstDash val="solid"/>
+                    </a:lnBlToTr>
+                    <a:noFill/>
+                  </a:tcPr>
+                </a:tc>
+              </a:tr>
+              <a:tr h="991682">
+                <a:tc>
+                  <a:txBody>
+                    <a:bodyPr/>
+                    <a:lstStyle/>
+                    <a:p>
+                      <a:endParaRPr lang="en-GB" b="1">
+                        <a:solidFill>
+                          <a:schemeClr val="tx1"/>
+                        </a:solidFill>
+                      </a:endParaRPr>
+                    </a:p>
+                  </a:txBody>
+                  <a:tcPr>
+                    <a:lnL w="12700" cmpd="sng">
+                      <a:noFill/>
+                    </a:lnL>
+                    <a:lnR w="12700" cmpd="sng">
+                      <a:noFill/>
+                    </a:lnR>
+                    <a:lnT w="12700" cmpd="sng">
+                      <a:noFill/>
+                    </a:lnT>
+                    <a:lnB w="12700" cmpd="sng">
+                      <a:noFill/>
+                    </a:lnB>
+                    <a:lnTlToBr w="12700" cmpd="sng">
+                      <a:noFill/>
+                      <a:prstDash val="solid"/>
+                    </a:lnTlToBr>
+                    <a:lnBlToTr w="12700" cmpd="sng">
+                      <a:noFill/>
+                      <a:prstDash val="solid"/>
+                    </a:lnBlToTr>
+                    <a:noFill/>
+                  </a:tcPr>
+                </a:tc>
+                <a:tc>
+                  <a:txBody>
+                    <a:bodyPr/>
+                    <a:lstStyle/>
+                    <a:p>
+                      <a:endParaRPr lang="en-GB" b="1">
+                        <a:solidFill>
+                          <a:schemeClr val="tx1"/>
+                        </a:solidFill>
+                      </a:endParaRPr>
+                    </a:p>
+                  </a:txBody>
+                  <a:tcPr>
+                    <a:lnL w="12700" cmpd="sng">
+                      <a:noFill/>
+                    </a:lnL>
+                    <a:lnR w="12700" cmpd="sng">
+                      <a:noFill/>
+                    </a:lnR>
+                    <a:lnT w="12700" cmpd="sng">
+                      <a:noFill/>
+                    </a:lnT>
+                    <a:lnB w="12700" cmpd="sng">
+                      <a:noFill/>
+                    </a:lnB>
+                    <a:lnTlToBr w="12700" cmpd="sng">
+                      <a:noFill/>
+                      <a:prstDash val="solid"/>
+                    </a:lnTlToBr>
+                    <a:lnBlToTr w="12700" cmpd="sng">
+                      <a:noFill/>
+                      <a:prstDash val="solid"/>
+                    </a:lnBlToTr>
+                    <a:noFill/>
+                  </a:tcPr>
+                </a:tc>
+                <a:tc>
+                  <a:txBody>
+                    <a:bodyPr/>
+                    <a:lstStyle/>
+                    <a:p>
+                      <a:endParaRPr lang="en-GB" b="1">
+                        <a:solidFill>
+                          <a:schemeClr val="tx1"/>
+                        </a:solidFill>
+                      </a:endParaRPr>
+                    </a:p>
+                  </a:txBody>
+                  <a:tcPr>
+                    <a:lnL w="12700" cmpd="sng">
+                      <a:noFill/>
+                    </a:lnL>
+                    <a:lnR w="12700" cmpd="sng">
+                      <a:noFill/>
+                    </a:lnR>
+                    <a:lnT w="12700" cmpd="sng">
+                      <a:noFill/>
+                    </a:lnT>
+                    <a:lnB w="12700" cmpd="sng">
+                      <a:noFill/>
+                    </a:lnB>
+                    <a:lnTlToBr w="12700" cmpd="sng">
+                      <a:noFill/>
+                      <a:prstDash val="solid"/>
+                    </a:lnTlToBr>
+                    <a:lnBlToTr w="12700" cmpd="sng">
+                      <a:noFill/>
+                      <a:prstDash val="solid"/>
+                    </a:lnBlToTr>
+                    <a:noFill/>
+                  </a:tcPr>
+                </a:tc>
+                <a:tc>
+                  <a:txBody>
+                    <a:bodyPr/>
+                    <a:lstStyle/>
+                    <a:p>
+                      <a:endParaRPr lang="en-GB" b="1">
+                        <a:solidFill>
+                          <a:schemeClr val="tx1"/>
+                        </a:solidFill>
+                      </a:endParaRPr>
+                    </a:p>
+                  </a:txBody>
+                  <a:tcPr>
+                    <a:lnL w="12700" cmpd="sng">
+                      <a:noFill/>
+                    </a:lnL>
+                    <a:lnR w="12700" cmpd="sng">
+                      <a:noFill/>
+                    </a:lnR>
+                    <a:lnT w="12700" cmpd="sng">
+                      <a:noFill/>
+                    </a:lnT>
+                    <a:lnB w="12700" cmpd="sng">
+                      <a:noFill/>
+                    </a:lnB>
+                    <a:lnTlToBr w="12700" cmpd="sng">
+                      <a:noFill/>
+                      <a:prstDash val="solid"/>
+                    </a:lnTlToBr>
+                    <a:lnBlToTr w="12700" cmpd="sng">
+                      <a:noFill/>
+                      <a:prstDash val="solid"/>
+                    </a:lnBlToTr>
+                    <a:noFill/>
+                  </a:tcPr>
+                </a:tc>
+                <a:tc>
+                  <a:txBody>
+                    <a:bodyPr/>
+                    <a:lstStyle/>
+                    <a:p>
+                      <a:endParaRPr lang="en-GB" b="1">
+                        <a:solidFill>
+                          <a:schemeClr val="tx1"/>
+                        </a:solidFill>
+                      </a:endParaRPr>
+                    </a:p>
+                  </a:txBody>
+                  <a:tcPr>
+                    <a:lnL w="12700" cmpd="sng">
+                      <a:noFill/>
+                    </a:lnL>
+                    <a:lnR w="12700" cmpd="sng">
+                      <a:noFill/>
+                    </a:lnR>
+                    <a:lnT w="12700" cmpd="sng">
+                      <a:noFill/>
+                    </a:lnT>
+                    <a:lnB w="12700" cmpd="sng">
+                      <a:noFill/>
+                    </a:lnB>
+                    <a:lnTlToBr w="12700" cmpd="sng">
+                      <a:noFill/>
+                      <a:prstDash val="solid"/>
+                    </a:lnTlToBr>
+                    <a:lnBlToTr w="12700" cmpd="sng">
+                      <a:noFill/>
+                      <a:prstDash val="solid"/>
+                    </a:lnBlToTr>
+                    <a:noFill/>
+                  </a:tcPr>
+                </a:tc>
+                <a:tc>
+                  <a:txBody>
+                    <a:bodyPr/>
+                    <a:lstStyle/>
+                    <a:p>
+                      <a:endParaRPr lang="en-GB" b="1">
+                        <a:solidFill>
+                          <a:schemeClr val="tx1"/>
+                        </a:solidFill>
+                      </a:endParaRPr>
+                    </a:p>
+                  </a:txBody>
+                  <a:tcPr>
+                    <a:lnL w="12700" cmpd="sng">
+                      <a:noFill/>
+                    </a:lnL>
+                    <a:lnR w="12700" cmpd="sng">
+                      <a:noFill/>
+                    </a:lnR>
+                    <a:lnT w="12700" cmpd="sng">
+                      <a:noFill/>
+                    </a:lnT>
+                    <a:lnB w="12700" cmpd="sng">
+                      <a:noFill/>
+                    </a:lnB>
+                    <a:lnTlToBr w="12700" cmpd="sng">
+                      <a:noFill/>
+                      <a:prstDash val="solid"/>
+                    </a:lnTlToBr>
+                    <a:lnBlToTr w="12700" cmpd="sng">
+                      <a:noFill/>
+                      <a:prstDash val="solid"/>
+                    </a:lnBlToTr>
+                    <a:noFill/>
+                  </a:tcPr>
+                </a:tc>
+                <a:tc>
+                  <a:txBody>
+                    <a:bodyPr/>
+                    <a:lstStyle/>
+                    <a:p>
+                      <a:endParaRPr lang="en-GB" b="1">
+                        <a:solidFill>
+                          <a:schemeClr val="tx1"/>
+                        </a:solidFill>
+                      </a:endParaRPr>
+                    </a:p>
+                  </a:txBody>
+                  <a:tcPr>
+                    <a:lnL w="12700" cmpd="sng">
+                      <a:noFill/>
+                    </a:lnL>
+                    <a:lnR w="12700" cmpd="sng">
+                      <a:noFill/>
+                    </a:lnR>
+                    <a:lnT w="12700" cmpd="sng">
+                      <a:noFill/>
+                    </a:lnT>
+                    <a:lnB w="12700" cmpd="sng">
+                      <a:noFill/>
+                    </a:lnB>
+                    <a:lnTlToBr w="12700" cmpd="sng">
+                      <a:noFill/>
+                      <a:prstDash val="solid"/>
+                    </a:lnTlToBr>
+                    <a:lnBlToTr w="12700" cmpd="sng">
+                      <a:noFill/>
+                      <a:prstDash val="solid"/>
+                    </a:lnBlToTr>
+                    <a:noFill/>
+                  </a:tcPr>
+                </a:tc>
+                <a:tc>
+                  <a:txBody>
+                    <a:bodyPr/>
+                    <a:lstStyle/>
+                    <a:p>
+                      <a:endParaRPr lang="en-GB" b="1">
+                        <a:solidFill>
+                          <a:schemeClr val="tx1"/>
+                        </a:solidFill>
+                      </a:endParaRPr>
+                    </a:p>
+                  </a:txBody>
+                  <a:tcPr>
+                    <a:lnL w="12700" cmpd="sng">
+                      <a:noFill/>
+                    </a:lnL>
+                    <a:lnR w="12700" cmpd="sng">
+                      <a:noFill/>
+                    </a:lnR>
+                    <a:lnT w="12700" cmpd="sng">
+                      <a:noFill/>
+                    </a:lnT>
+                    <a:lnB w="12700" cmpd="sng">
+                      <a:noFill/>
+                    </a:lnB>
+                    <a:lnTlToBr w="12700" cmpd="sng">
+                      <a:noFill/>
+                      <a:prstDash val="solid"/>
+                    </a:lnTlToBr>
+                    <a:lnBlToTr w="12700" cmpd="sng">
+                      <a:noFill/>
+                      <a:prstDash val="solid"/>
+                    </a:lnBlToTr>
+                    <a:noFill/>
+                  </a:tcPr>
+                </a:tc>
+                <a:tc>
+                  <a:txBody>
+                    <a:bodyPr/>
+                    <a:lstStyle/>
+                    <a:p>
+                      <a:endParaRPr lang="en-GB" b="1">
+                        <a:solidFill>
+                          <a:schemeClr val="tx1"/>
+                        </a:solidFill>
+                      </a:endParaRPr>
+                    </a:p>
+                  </a:txBody>
+                  <a:tcPr>
+                    <a:lnL w="12700" cmpd="sng">
+                      <a:noFill/>
+                    </a:lnL>
+                    <a:lnR w="12700" cmpd="sng">
+                      <a:noFill/>
+                    </a:lnR>
+                    <a:lnT w="12700" cmpd="sng">
+                      <a:noFill/>
+                    </a:lnT>
+                    <a:lnB w="12700" cmpd="sng">
+                      <a:noFill/>
+                    </a:lnB>
+                    <a:lnTlToBr w="12700" cmpd="sng">
+                      <a:noFill/>
+                      <a:prstDash val="solid"/>
+                    </a:lnTlToBr>
+                    <a:lnBlToTr w="12700" cmpd="sng">
+                      <a:noFill/>
+                      <a:prstDash val="solid"/>
+                    </a:lnBlToTr>
+                    <a:noFill/>
+                  </a:tcPr>
+                </a:tc>
+                <a:tc>
+                  <a:txBody>
+                    <a:bodyPr/>
+                    <a:lstStyle/>
+                    <a:p>
+                      <a:endParaRPr lang="en-GB" b="1" dirty="0">
+                        <a:solidFill>
+                          <a:schemeClr val="tx1"/>
+                        </a:solidFill>
+                      </a:endParaRPr>
+                    </a:p>
+                  </a:txBody>
+                  <a:tcPr>
+                    <a:lnL w="12700" cmpd="sng">
+                      <a:noFill/>
+                    </a:lnL>
+                    <a:lnR w="12700" cmpd="sng">
+                      <a:noFill/>
+                    </a:lnR>
+                    <a:lnT w="12700" cmpd="sng">
+                      <a:noFill/>
+                    </a:lnT>
+                    <a:lnB w="12700" cmpd="sng">
+                      <a:noFill/>
+                    </a:lnB>
+                    <a:lnTlToBr w="12700" cmpd="sng">
+                      <a:noFill/>
+                      <a:prstDash val="solid"/>
+                    </a:lnTlToBr>
+                    <a:lnBlToTr w="12700" cmpd="sng">
+                      <a:noFill/>
+                      <a:prstDash val="solid"/>
+                    </a:lnBlToTr>
+                    <a:noFill/>
+                  </a:tcPr>
+                </a:tc>
+              </a:tr>
+            </a:tbl>
+          </a:graphicData>
+        </a:graphic>
+      </p:graphicFrame>
     </p:spTree>
     <p:extLst>
       <p:ext uri="{BB962C8B-B14F-4D97-AF65-F5344CB8AC3E}">

</xml_diff>

<commit_message>
Story movement completed, IO+debug furniture added
</commit_message>
<xml_diff>
--- a/MeetEDSAC/Assets/_Content/Story/story outline.pptx
+++ b/MeetEDSAC/Assets/_Content/Story/story outline.pptx
@@ -243,7 +243,7 @@
           <a:p>
             <a:fld id="{95ED7EDB-5CB9-4918-85FF-2C5E84178964}" type="datetimeFigureOut">
               <a:rPr lang="en-GB" smtClean="0"/>
-              <a:t>27/08/2015</a:t>
+              <a:t>28/08/2015</a:t>
             </a:fld>
             <a:endParaRPr lang="en-GB"/>
           </a:p>
@@ -413,7 +413,7 @@
           <a:p>
             <a:fld id="{95ED7EDB-5CB9-4918-85FF-2C5E84178964}" type="datetimeFigureOut">
               <a:rPr lang="en-GB" smtClean="0"/>
-              <a:t>27/08/2015</a:t>
+              <a:t>28/08/2015</a:t>
             </a:fld>
             <a:endParaRPr lang="en-GB"/>
           </a:p>
@@ -593,7 +593,7 @@
           <a:p>
             <a:fld id="{95ED7EDB-5CB9-4918-85FF-2C5E84178964}" type="datetimeFigureOut">
               <a:rPr lang="en-GB" smtClean="0"/>
-              <a:t>27/08/2015</a:t>
+              <a:t>28/08/2015</a:t>
             </a:fld>
             <a:endParaRPr lang="en-GB"/>
           </a:p>
@@ -763,7 +763,7 @@
           <a:p>
             <a:fld id="{95ED7EDB-5CB9-4918-85FF-2C5E84178964}" type="datetimeFigureOut">
               <a:rPr lang="en-GB" smtClean="0"/>
-              <a:t>27/08/2015</a:t>
+              <a:t>28/08/2015</a:t>
             </a:fld>
             <a:endParaRPr lang="en-GB"/>
           </a:p>
@@ -1009,7 +1009,7 @@
           <a:p>
             <a:fld id="{95ED7EDB-5CB9-4918-85FF-2C5E84178964}" type="datetimeFigureOut">
               <a:rPr lang="en-GB" smtClean="0"/>
-              <a:t>27/08/2015</a:t>
+              <a:t>28/08/2015</a:t>
             </a:fld>
             <a:endParaRPr lang="en-GB"/>
           </a:p>
@@ -1241,7 +1241,7 @@
           <a:p>
             <a:fld id="{95ED7EDB-5CB9-4918-85FF-2C5E84178964}" type="datetimeFigureOut">
               <a:rPr lang="en-GB" smtClean="0"/>
-              <a:t>27/08/2015</a:t>
+              <a:t>28/08/2015</a:t>
             </a:fld>
             <a:endParaRPr lang="en-GB"/>
           </a:p>
@@ -1608,7 +1608,7 @@
           <a:p>
             <a:fld id="{95ED7EDB-5CB9-4918-85FF-2C5E84178964}" type="datetimeFigureOut">
               <a:rPr lang="en-GB" smtClean="0"/>
-              <a:t>27/08/2015</a:t>
+              <a:t>28/08/2015</a:t>
             </a:fld>
             <a:endParaRPr lang="en-GB"/>
           </a:p>
@@ -1726,7 +1726,7 @@
           <a:p>
             <a:fld id="{95ED7EDB-5CB9-4918-85FF-2C5E84178964}" type="datetimeFigureOut">
               <a:rPr lang="en-GB" smtClean="0"/>
-              <a:t>27/08/2015</a:t>
+              <a:t>28/08/2015</a:t>
             </a:fld>
             <a:endParaRPr lang="en-GB"/>
           </a:p>
@@ -1821,7 +1821,7 @@
           <a:p>
             <a:fld id="{95ED7EDB-5CB9-4918-85FF-2C5E84178964}" type="datetimeFigureOut">
               <a:rPr lang="en-GB" smtClean="0"/>
-              <a:t>27/08/2015</a:t>
+              <a:t>28/08/2015</a:t>
             </a:fld>
             <a:endParaRPr lang="en-GB"/>
           </a:p>
@@ -2098,7 +2098,7 @@
           <a:p>
             <a:fld id="{95ED7EDB-5CB9-4918-85FF-2C5E84178964}" type="datetimeFigureOut">
               <a:rPr lang="en-GB" smtClean="0"/>
-              <a:t>27/08/2015</a:t>
+              <a:t>28/08/2015</a:t>
             </a:fld>
             <a:endParaRPr lang="en-GB"/>
           </a:p>
@@ -2351,7 +2351,7 @@
           <a:p>
             <a:fld id="{95ED7EDB-5CB9-4918-85FF-2C5E84178964}" type="datetimeFigureOut">
               <a:rPr lang="en-GB" smtClean="0"/>
-              <a:t>27/08/2015</a:t>
+              <a:t>28/08/2015</a:t>
             </a:fld>
             <a:endParaRPr lang="en-GB"/>
           </a:p>
@@ -2564,7 +2564,7 @@
           <a:p>
             <a:fld id="{95ED7EDB-5CB9-4918-85FF-2C5E84178964}" type="datetimeFigureOut">
               <a:rPr lang="en-GB" smtClean="0"/>
-              <a:t>27/08/2015</a:t>
+              <a:t>28/08/2015</a:t>
             </a:fld>
             <a:endParaRPr lang="en-GB"/>
           </a:p>
@@ -3102,11 +3102,7 @@
             <a:pPr algn="ctr"/>
             <a:r>
               <a:rPr lang="en-GB" sz="1400" dirty="0" smtClean="0"/>
-              <a:t>Just like the computers of today, </a:t>
-            </a:r>
-            <a:r>
-              <a:rPr lang="en-GB" sz="1400" dirty="0" smtClean="0"/>
-              <a:t>on </a:t>
+              <a:t>Just like the computers of today, on </a:t>
             </a:r>
             <a:r>
               <a:rPr lang="en-GB" sz="1400" dirty="0" err="1" smtClean="0"/>
@@ -3114,11 +3110,7 @@
             </a:r>
             <a:r>
               <a:rPr lang="en-GB" sz="1400" dirty="0" smtClean="0"/>
-              <a:t> a </a:t>
-            </a:r>
-            <a:r>
-              <a:rPr lang="en-GB" sz="1400" dirty="0" smtClean="0"/>
-              <a:t>low level program runs to load code into memory. Whereas nowadays we would normally first load an operating system, which would then handle our application, on the EDSAC the program that you had written would take control at this stage.</a:t>
+              <a:t> a low level program runs to load code into memory. Whereas nowadays we would normally first load an operating system, which would then handle our application, on the EDSAC the program that you had written would take control at this stage.</a:t>
             </a:r>
             <a:endParaRPr lang="en-GB" sz="1400" dirty="0"/>
           </a:p>
@@ -3871,7 +3863,6 @@
               <a:rPr lang="en-GB" sz="1400" dirty="0"/>
               <a:t>And then it’s time for the process to begin again with the next scientist’s calculations.</a:t>
             </a:r>
-            <a:endParaRPr lang="en-GB" sz="1400" dirty="0"/>
           </a:p>
         </p:txBody>
       </p:sp>
@@ -3884,7 +3875,7 @@
           <p:nvPr>
             <p:extLst>
               <p:ext uri="{D42A27DB-BD31-4B8C-83A1-F6EECF244321}">
-                <p14:modId xmlns:p14="http://schemas.microsoft.com/office/powerpoint/2010/main" val="2045663633"/>
+                <p14:modId xmlns:p14="http://schemas.microsoft.com/office/powerpoint/2010/main" val="4099153514"/>
               </p:ext>
             </p:extLst>
           </p:nvPr>
@@ -5870,7 +5861,15 @@
                             <a:schemeClr val="tx1"/>
                           </a:solidFill>
                         </a:rPr>
-                        <a:t>Table with tape</a:t>
+                        <a:t>4Table </a:t>
+                      </a:r>
+                      <a:r>
+                        <a:rPr lang="en-GB" b="1" dirty="0" smtClean="0">
+                          <a:solidFill>
+                            <a:schemeClr val="tx1"/>
+                          </a:solidFill>
+                        </a:rPr>
+                        <a:t>with tape</a:t>
                       </a:r>
                       <a:endParaRPr lang="en-GB" b="1" dirty="0">
                         <a:solidFill>
@@ -6105,12 +6104,20 @@
                     <a:lstStyle/>
                     <a:p>
                       <a:r>
+                        <a:rPr lang="en-GB" b="1" smtClean="0">
+                          <a:solidFill>
+                            <a:schemeClr val="tx1"/>
+                          </a:solidFill>
+                        </a:rPr>
+                        <a:t>14Pan </a:t>
+                      </a:r>
+                      <a:r>
                         <a:rPr lang="en-GB" b="1" dirty="0" smtClean="0">
                           <a:solidFill>
                             <a:schemeClr val="tx1"/>
                           </a:solidFill>
                         </a:rPr>
-                        <a:t>Pan storage regen units</a:t>
+                        <a:t>storage regen units</a:t>
                       </a:r>
                       <a:endParaRPr lang="en-GB" b="1" dirty="0">
                         <a:solidFill>

</xml_diff>